<commit_message>
Add chart pro and cons
</commit_message>
<xml_diff>
--- a/Stackoverflow Programmer's Story.pptx
+++ b/Stackoverflow Programmer's Story.pptx
@@ -7,16 +7,24 @@
     <p:sldMasterId id="2147483660" r:id="rId3"/>
   </p:sldMasterIdLst>
   <p:notesMasterIdLst>
-    <p:notesMasterId r:id="rId11"/>
+    <p:notesMasterId r:id="rId19"/>
   </p:notesMasterIdLst>
   <p:sldIdLst>
     <p:sldId id="348" r:id="rId4"/>
     <p:sldId id="357" r:id="rId5"/>
     <p:sldId id="358" r:id="rId6"/>
     <p:sldId id="359" r:id="rId7"/>
-    <p:sldId id="360" r:id="rId8"/>
-    <p:sldId id="361" r:id="rId9"/>
-    <p:sldId id="362" r:id="rId10"/>
+    <p:sldId id="363" r:id="rId8"/>
+    <p:sldId id="364" r:id="rId9"/>
+    <p:sldId id="360" r:id="rId10"/>
+    <p:sldId id="365" r:id="rId11"/>
+    <p:sldId id="366" r:id="rId12"/>
+    <p:sldId id="361" r:id="rId13"/>
+    <p:sldId id="367" r:id="rId14"/>
+    <p:sldId id="368" r:id="rId15"/>
+    <p:sldId id="362" r:id="rId16"/>
+    <p:sldId id="369" r:id="rId17"/>
+    <p:sldId id="370" r:id="rId18"/>
   </p:sldIdLst>
   <p:sldSz cx="12192000" cy="6858000"/>
   <p:notesSz cx="6858000" cy="9144000"/>
@@ -135,6 +143,1137 @@
 </p:cmAuthorLst>
 </file>
 
+<file path=ppt/charts/chart1.xml><?xml version="1.0" encoding="utf-8"?>
+<c:chartSpace xmlns:c="http://schemas.openxmlformats.org/drawingml/2006/chart" xmlns:a="http://schemas.openxmlformats.org/drawingml/2006/main" xmlns:r="http://schemas.openxmlformats.org/officeDocument/2006/relationships" xmlns:c16r2="http://schemas.microsoft.com/office/drawing/2015/06/chart">
+  <c:date1904 val="0"/>
+  <c:lang val="en-US"/>
+  <c:roundedCorners val="0"/>
+  <mc:AlternateContent xmlns:mc="http://schemas.openxmlformats.org/markup-compatibility/2006">
+    <mc:Choice xmlns:c14="http://schemas.microsoft.com/office/drawing/2007/8/2/chart" Requires="c14">
+      <c14:style val="102"/>
+    </mc:Choice>
+    <mc:Fallback>
+      <c:style val="2"/>
+    </mc:Fallback>
+  </mc:AlternateContent>
+  <c:pivotSource>
+    <c:name>[Tags.xls]Tag mentioned number by Year!PivotTable2</c:name>
+    <c:fmtId val="4"/>
+  </c:pivotSource>
+  <c:chart>
+    <c:title>
+      <c:tx>
+        <c:rich>
+          <a:bodyPr rot="0" spcFirstLastPara="1" vertOverflow="ellipsis" vert="horz" wrap="square" anchor="ctr" anchorCtr="1"/>
+          <a:lstStyle/>
+          <a:p>
+            <a:pPr>
+              <a:defRPr sz="1400" b="0" i="0" u="none" strike="noStrike" kern="1200" spc="0" baseline="0">
+                <a:solidFill>
+                  <a:schemeClr val="tx1">
+                    <a:lumMod val="65000"/>
+                    <a:lumOff val="35000"/>
+                  </a:schemeClr>
+                </a:solidFill>
+                <a:latin typeface="+mn-lt"/>
+                <a:ea typeface="+mn-ea"/>
+                <a:cs typeface="+mn-cs"/>
+              </a:defRPr>
+            </a:pPr>
+            <a:r>
+              <a:rPr lang="en-US"/>
+              <a:t>Total Posts</a:t>
+            </a:r>
+            <a:r>
+              <a:rPr lang="en-US" baseline="0"/>
+              <a:t> Per Year</a:t>
+            </a:r>
+            <a:endParaRPr lang="en-US"/>
+          </a:p>
+        </c:rich>
+      </c:tx>
+      <c:overlay val="0"/>
+      <c:spPr>
+        <a:noFill/>
+        <a:ln>
+          <a:noFill/>
+        </a:ln>
+        <a:effectLst/>
+      </c:spPr>
+      <c:txPr>
+        <a:bodyPr rot="0" spcFirstLastPara="1" vertOverflow="ellipsis" vert="horz" wrap="square" anchor="ctr" anchorCtr="1"/>
+        <a:lstStyle/>
+        <a:p>
+          <a:pPr>
+            <a:defRPr sz="1400" b="0" i="0" u="none" strike="noStrike" kern="1200" spc="0" baseline="0">
+              <a:solidFill>
+                <a:schemeClr val="tx1">
+                  <a:lumMod val="65000"/>
+                  <a:lumOff val="35000"/>
+                </a:schemeClr>
+              </a:solidFill>
+              <a:latin typeface="+mn-lt"/>
+              <a:ea typeface="+mn-ea"/>
+              <a:cs typeface="+mn-cs"/>
+            </a:defRPr>
+          </a:pPr>
+          <a:endParaRPr lang="en-US"/>
+        </a:p>
+      </c:txPr>
+    </c:title>
+    <c:autoTitleDeleted val="0"/>
+    <c:pivotFmts>
+      <c:pivotFmt>
+        <c:idx val="0"/>
+        <c:spPr>
+          <a:solidFill>
+            <a:schemeClr val="accent1"/>
+          </a:solidFill>
+          <a:ln w="28575" cap="rnd">
+            <a:solidFill>
+              <a:schemeClr val="accent1"/>
+            </a:solidFill>
+            <a:round/>
+          </a:ln>
+          <a:effectLst/>
+        </c:spPr>
+        <c:marker>
+          <c:symbol val="none"/>
+        </c:marker>
+        <c:dLbl>
+          <c:idx val="0"/>
+          <c:spPr>
+            <a:noFill/>
+            <a:ln>
+              <a:noFill/>
+            </a:ln>
+            <a:effectLst/>
+          </c:spPr>
+          <c:txPr>
+            <a:bodyPr rot="0" spcFirstLastPara="1" vertOverflow="ellipsis" vert="horz" wrap="square" lIns="38100" tIns="19050" rIns="38100" bIns="19050" anchor="ctr" anchorCtr="1">
+              <a:spAutoFit/>
+            </a:bodyPr>
+            <a:lstStyle/>
+            <a:p>
+              <a:pPr>
+                <a:defRPr sz="900" b="0" i="0" u="none" strike="noStrike" kern="1200" baseline="0">
+                  <a:solidFill>
+                    <a:schemeClr val="tx1">
+                      <a:lumMod val="75000"/>
+                      <a:lumOff val="25000"/>
+                    </a:schemeClr>
+                  </a:solidFill>
+                  <a:latin typeface="+mn-lt"/>
+                  <a:ea typeface="+mn-ea"/>
+                  <a:cs typeface="+mn-cs"/>
+                </a:defRPr>
+              </a:pPr>
+              <a:endParaRPr lang="en-US"/>
+            </a:p>
+          </c:txPr>
+          <c:showLegendKey val="0"/>
+          <c:showVal val="0"/>
+          <c:showCatName val="0"/>
+          <c:showSerName val="0"/>
+          <c:showPercent val="0"/>
+          <c:showBubbleSize val="0"/>
+          <c:extLst>
+            <c:ext xmlns:c15="http://schemas.microsoft.com/office/drawing/2012/chart" uri="{CE6537A1-D6FC-4f65-9D91-7224C49458BB}"/>
+          </c:extLst>
+        </c:dLbl>
+      </c:pivotFmt>
+      <c:pivotFmt>
+        <c:idx val="1"/>
+        <c:spPr>
+          <a:solidFill>
+            <a:schemeClr val="accent1"/>
+          </a:solidFill>
+          <a:ln w="28575" cap="rnd">
+            <a:solidFill>
+              <a:schemeClr val="accent1"/>
+            </a:solidFill>
+            <a:round/>
+          </a:ln>
+          <a:effectLst/>
+        </c:spPr>
+        <c:marker>
+          <c:symbol val="none"/>
+        </c:marker>
+        <c:dLbl>
+          <c:idx val="0"/>
+          <c:spPr>
+            <a:noFill/>
+            <a:ln>
+              <a:noFill/>
+            </a:ln>
+            <a:effectLst/>
+          </c:spPr>
+          <c:txPr>
+            <a:bodyPr rot="0" spcFirstLastPara="1" vertOverflow="ellipsis" vert="horz" wrap="square" lIns="38100" tIns="19050" rIns="38100" bIns="19050" anchor="ctr" anchorCtr="1">
+              <a:spAutoFit/>
+            </a:bodyPr>
+            <a:lstStyle/>
+            <a:p>
+              <a:pPr>
+                <a:defRPr sz="900" b="0" i="0" u="none" strike="noStrike" kern="1200" baseline="0">
+                  <a:solidFill>
+                    <a:schemeClr val="tx1">
+                      <a:lumMod val="75000"/>
+                      <a:lumOff val="25000"/>
+                    </a:schemeClr>
+                  </a:solidFill>
+                  <a:latin typeface="+mn-lt"/>
+                  <a:ea typeface="+mn-ea"/>
+                  <a:cs typeface="+mn-cs"/>
+                </a:defRPr>
+              </a:pPr>
+              <a:endParaRPr lang="en-US"/>
+            </a:p>
+          </c:txPr>
+          <c:showLegendKey val="0"/>
+          <c:showVal val="0"/>
+          <c:showCatName val="0"/>
+          <c:showSerName val="0"/>
+          <c:showPercent val="0"/>
+          <c:showBubbleSize val="0"/>
+          <c:extLst>
+            <c:ext xmlns:c15="http://schemas.microsoft.com/office/drawing/2012/chart" uri="{CE6537A1-D6FC-4f65-9D91-7224C49458BB}"/>
+          </c:extLst>
+        </c:dLbl>
+      </c:pivotFmt>
+      <c:pivotFmt>
+        <c:idx val="2"/>
+        <c:spPr>
+          <a:solidFill>
+            <a:schemeClr val="accent1"/>
+          </a:solidFill>
+          <a:ln w="28575" cap="rnd">
+            <a:solidFill>
+              <a:schemeClr val="accent1"/>
+            </a:solidFill>
+            <a:round/>
+          </a:ln>
+          <a:effectLst/>
+        </c:spPr>
+        <c:marker>
+          <c:symbol val="none"/>
+        </c:marker>
+        <c:dLbl>
+          <c:idx val="0"/>
+          <c:spPr>
+            <a:noFill/>
+            <a:ln>
+              <a:noFill/>
+            </a:ln>
+            <a:effectLst/>
+          </c:spPr>
+          <c:txPr>
+            <a:bodyPr rot="0" spcFirstLastPara="1" vertOverflow="ellipsis" vert="horz" wrap="square" lIns="38100" tIns="19050" rIns="38100" bIns="19050" anchor="ctr" anchorCtr="1">
+              <a:spAutoFit/>
+            </a:bodyPr>
+            <a:lstStyle/>
+            <a:p>
+              <a:pPr>
+                <a:defRPr sz="900" b="0" i="0" u="none" strike="noStrike" kern="1200" baseline="0">
+                  <a:solidFill>
+                    <a:schemeClr val="tx1">
+                      <a:lumMod val="75000"/>
+                      <a:lumOff val="25000"/>
+                    </a:schemeClr>
+                  </a:solidFill>
+                  <a:latin typeface="+mn-lt"/>
+                  <a:ea typeface="+mn-ea"/>
+                  <a:cs typeface="+mn-cs"/>
+                </a:defRPr>
+              </a:pPr>
+              <a:endParaRPr lang="en-US"/>
+            </a:p>
+          </c:txPr>
+          <c:showLegendKey val="0"/>
+          <c:showVal val="0"/>
+          <c:showCatName val="0"/>
+          <c:showSerName val="0"/>
+          <c:showPercent val="0"/>
+          <c:showBubbleSize val="0"/>
+          <c:extLst>
+            <c:ext xmlns:c15="http://schemas.microsoft.com/office/drawing/2012/chart" uri="{CE6537A1-D6FC-4f65-9D91-7224C49458BB}"/>
+          </c:extLst>
+        </c:dLbl>
+      </c:pivotFmt>
+    </c:pivotFmts>
+    <c:plotArea>
+      <c:layout/>
+      <c:lineChart>
+        <c:grouping val="standard"/>
+        <c:varyColors val="0"/>
+        <c:ser>
+          <c:idx val="0"/>
+          <c:order val="0"/>
+          <c:tx>
+            <c:strRef>
+              <c:f>'Tag mentioned number by Year'!$K$59395:$K$59396</c:f>
+              <c:strCache>
+                <c:ptCount val="1"/>
+                <c:pt idx="0">
+                  <c:v>Total</c:v>
+                </c:pt>
+              </c:strCache>
+            </c:strRef>
+          </c:tx>
+          <c:spPr>
+            <a:ln w="28575" cap="rnd">
+              <a:solidFill>
+                <a:schemeClr val="accent1"/>
+              </a:solidFill>
+              <a:round/>
+            </a:ln>
+            <a:effectLst/>
+          </c:spPr>
+          <c:marker>
+            <c:symbol val="none"/>
+          </c:marker>
+          <c:cat>
+            <c:strRef>
+              <c:f>'Tag mentioned number by Year'!$J$59397:$J$59406</c:f>
+              <c:strCache>
+                <c:ptCount val="9"/>
+                <c:pt idx="0">
+                  <c:v>2008</c:v>
+                </c:pt>
+                <c:pt idx="1">
+                  <c:v>2009</c:v>
+                </c:pt>
+                <c:pt idx="2">
+                  <c:v>2010</c:v>
+                </c:pt>
+                <c:pt idx="3">
+                  <c:v>2011</c:v>
+                </c:pt>
+                <c:pt idx="4">
+                  <c:v>2012</c:v>
+                </c:pt>
+                <c:pt idx="5">
+                  <c:v>2013</c:v>
+                </c:pt>
+                <c:pt idx="6">
+                  <c:v>2014</c:v>
+                </c:pt>
+                <c:pt idx="7">
+                  <c:v>2015</c:v>
+                </c:pt>
+                <c:pt idx="8">
+                  <c:v>2016</c:v>
+                </c:pt>
+              </c:strCache>
+            </c:strRef>
+          </c:cat>
+          <c:val>
+            <c:numRef>
+              <c:f>'Tag mentioned number by Year'!$K$59397:$K$59406</c:f>
+              <c:numCache>
+                <c:formatCode>General</c:formatCode>
+                <c:ptCount val="9"/>
+                <c:pt idx="0">
+                  <c:v>1190</c:v>
+                </c:pt>
+                <c:pt idx="1">
+                  <c:v>12716</c:v>
+                </c:pt>
+                <c:pt idx="2">
+                  <c:v>29532</c:v>
+                </c:pt>
+                <c:pt idx="3">
+                  <c:v>67355</c:v>
+                </c:pt>
+                <c:pt idx="4">
+                  <c:v>112096</c:v>
+                </c:pt>
+                <c:pt idx="5">
+                  <c:v>144145</c:v>
+                </c:pt>
+                <c:pt idx="6">
+                  <c:v>145858</c:v>
+                </c:pt>
+                <c:pt idx="7">
+                  <c:v>194118</c:v>
+                </c:pt>
+                <c:pt idx="8">
+                  <c:v>118387</c:v>
+                </c:pt>
+              </c:numCache>
+            </c:numRef>
+          </c:val>
+          <c:smooth val="0"/>
+          <c:extLst>
+            <c:ext xmlns:c16="http://schemas.microsoft.com/office/drawing/2014/chart" uri="{C3380CC4-5D6E-409C-BE32-E72D297353CC}">
+              <c16:uniqueId val="{00000000-258C-6A44-BFCB-9078370560A9}"/>
+            </c:ext>
+          </c:extLst>
+        </c:ser>
+        <c:dLbls>
+          <c:showLegendKey val="0"/>
+          <c:showVal val="0"/>
+          <c:showCatName val="0"/>
+          <c:showSerName val="0"/>
+          <c:showPercent val="0"/>
+          <c:showBubbleSize val="0"/>
+        </c:dLbls>
+        <c:smooth val="0"/>
+        <c:axId val="567901312"/>
+        <c:axId val="578059136"/>
+      </c:lineChart>
+      <c:catAx>
+        <c:axId val="567901312"/>
+        <c:scaling>
+          <c:orientation val="minMax"/>
+        </c:scaling>
+        <c:delete val="0"/>
+        <c:axPos val="b"/>
+        <c:numFmt formatCode="General" sourceLinked="1"/>
+        <c:majorTickMark val="none"/>
+        <c:minorTickMark val="none"/>
+        <c:tickLblPos val="nextTo"/>
+        <c:spPr>
+          <a:noFill/>
+          <a:ln w="9525" cap="flat" cmpd="sng" algn="ctr">
+            <a:solidFill>
+              <a:schemeClr val="tx1">
+                <a:lumMod val="15000"/>
+                <a:lumOff val="85000"/>
+              </a:schemeClr>
+            </a:solidFill>
+            <a:round/>
+          </a:ln>
+          <a:effectLst/>
+        </c:spPr>
+        <c:txPr>
+          <a:bodyPr rot="-60000000" spcFirstLastPara="1" vertOverflow="ellipsis" vert="horz" wrap="square" anchor="ctr" anchorCtr="1"/>
+          <a:lstStyle/>
+          <a:p>
+            <a:pPr>
+              <a:defRPr sz="900" b="0" i="0" u="none" strike="noStrike" kern="1200" baseline="0">
+                <a:solidFill>
+                  <a:schemeClr val="tx1">
+                    <a:lumMod val="65000"/>
+                    <a:lumOff val="35000"/>
+                  </a:schemeClr>
+                </a:solidFill>
+                <a:latin typeface="+mn-lt"/>
+                <a:ea typeface="+mn-ea"/>
+                <a:cs typeface="+mn-cs"/>
+              </a:defRPr>
+            </a:pPr>
+            <a:endParaRPr lang="en-US"/>
+          </a:p>
+        </c:txPr>
+        <c:crossAx val="578059136"/>
+        <c:crosses val="autoZero"/>
+        <c:auto val="1"/>
+        <c:lblAlgn val="ctr"/>
+        <c:lblOffset val="100"/>
+        <c:noMultiLvlLbl val="0"/>
+      </c:catAx>
+      <c:valAx>
+        <c:axId val="578059136"/>
+        <c:scaling>
+          <c:orientation val="minMax"/>
+        </c:scaling>
+        <c:delete val="0"/>
+        <c:axPos val="l"/>
+        <c:majorGridlines>
+          <c:spPr>
+            <a:ln w="9525" cap="flat" cmpd="sng" algn="ctr">
+              <a:solidFill>
+                <a:schemeClr val="tx1">
+                  <a:lumMod val="15000"/>
+                  <a:lumOff val="85000"/>
+                </a:schemeClr>
+              </a:solidFill>
+              <a:round/>
+            </a:ln>
+            <a:effectLst/>
+          </c:spPr>
+        </c:majorGridlines>
+        <c:numFmt formatCode="General" sourceLinked="1"/>
+        <c:majorTickMark val="none"/>
+        <c:minorTickMark val="none"/>
+        <c:tickLblPos val="nextTo"/>
+        <c:spPr>
+          <a:noFill/>
+          <a:ln>
+            <a:noFill/>
+          </a:ln>
+          <a:effectLst/>
+        </c:spPr>
+        <c:txPr>
+          <a:bodyPr rot="-60000000" spcFirstLastPara="1" vertOverflow="ellipsis" vert="horz" wrap="square" anchor="ctr" anchorCtr="1"/>
+          <a:lstStyle/>
+          <a:p>
+            <a:pPr>
+              <a:defRPr sz="900" b="0" i="0" u="none" strike="noStrike" kern="1200" baseline="0">
+                <a:solidFill>
+                  <a:schemeClr val="tx1">
+                    <a:lumMod val="65000"/>
+                    <a:lumOff val="35000"/>
+                  </a:schemeClr>
+                </a:solidFill>
+                <a:latin typeface="+mn-lt"/>
+                <a:ea typeface="+mn-ea"/>
+                <a:cs typeface="+mn-cs"/>
+              </a:defRPr>
+            </a:pPr>
+            <a:endParaRPr lang="en-US"/>
+          </a:p>
+        </c:txPr>
+        <c:crossAx val="567901312"/>
+        <c:crosses val="autoZero"/>
+        <c:crossBetween val="between"/>
+      </c:valAx>
+      <c:spPr>
+        <a:noFill/>
+        <a:ln>
+          <a:noFill/>
+        </a:ln>
+        <a:effectLst/>
+      </c:spPr>
+    </c:plotArea>
+    <c:legend>
+      <c:legendPos val="r"/>
+      <c:overlay val="0"/>
+      <c:spPr>
+        <a:noFill/>
+        <a:ln>
+          <a:noFill/>
+        </a:ln>
+        <a:effectLst/>
+      </c:spPr>
+      <c:txPr>
+        <a:bodyPr rot="0" spcFirstLastPara="1" vertOverflow="ellipsis" vert="horz" wrap="square" anchor="ctr" anchorCtr="1"/>
+        <a:lstStyle/>
+        <a:p>
+          <a:pPr>
+            <a:defRPr sz="900" b="0" i="0" u="none" strike="noStrike" kern="1200" baseline="0">
+              <a:solidFill>
+                <a:schemeClr val="tx1">
+                  <a:lumMod val="65000"/>
+                  <a:lumOff val="35000"/>
+                </a:schemeClr>
+              </a:solidFill>
+              <a:latin typeface="+mn-lt"/>
+              <a:ea typeface="+mn-ea"/>
+              <a:cs typeface="+mn-cs"/>
+            </a:defRPr>
+          </a:pPr>
+          <a:endParaRPr lang="en-US"/>
+        </a:p>
+      </c:txPr>
+    </c:legend>
+    <c:plotVisOnly val="1"/>
+    <c:dispBlanksAs val="gap"/>
+    <c:extLst>
+      <c:ext xmlns:c16r3="http://schemas.microsoft.com/office/drawing/2017/03/chart" uri="{56B9EC1D-385E-4148-901F-78D8002777C0}">
+        <c16r3:dataDisplayOptions16>
+          <c16r3:dispNaAsBlank val="1"/>
+        </c16r3:dataDisplayOptions16>
+      </c:ext>
+    </c:extLst>
+    <c:showDLblsOverMax val="0"/>
+  </c:chart>
+  <c:spPr>
+    <a:noFill/>
+    <a:ln>
+      <a:noFill/>
+    </a:ln>
+    <a:effectLst/>
+  </c:spPr>
+  <c:txPr>
+    <a:bodyPr/>
+    <a:lstStyle/>
+    <a:p>
+      <a:pPr>
+        <a:defRPr/>
+      </a:pPr>
+      <a:endParaRPr lang="en-US"/>
+    </a:p>
+  </c:txPr>
+  <c:externalData r:id="rId3">
+    <c:autoUpdate val="0"/>
+  </c:externalData>
+  <c:extLst>
+    <c:ext xmlns:c14="http://schemas.microsoft.com/office/drawing/2007/8/2/chart" uri="{781A3756-C4B2-4CAC-9D66-4F8BD8637D16}">
+      <c14:pivotOptions>
+        <c14:dropZoneFilter val="1"/>
+        <c14:dropZoneCategories val="1"/>
+        <c14:dropZoneData val="1"/>
+        <c14:dropZoneSeries val="1"/>
+        <c14:dropZonesVisible val="1"/>
+      </c14:pivotOptions>
+    </c:ext>
+    <c:ext xmlns:c16="http://schemas.microsoft.com/office/drawing/2014/chart" uri="{E28EC0CA-F0BB-4C9C-879D-F8772B89E7AC}">
+      <c16:pivotOptions16>
+        <c16:showExpandCollapseFieldButtons val="1"/>
+      </c16:pivotOptions16>
+    </c:ext>
+  </c:extLst>
+</c:chartSpace>
+</file>
+
+<file path=ppt/charts/colors1.xml><?xml version="1.0" encoding="utf-8"?>
+<cs:colorStyle xmlns:cs="http://schemas.microsoft.com/office/drawing/2012/chartStyle" xmlns:a="http://schemas.openxmlformats.org/drawingml/2006/main" meth="cycle" id="10">
+  <a:schemeClr val="accent1"/>
+  <a:schemeClr val="accent2"/>
+  <a:schemeClr val="accent3"/>
+  <a:schemeClr val="accent4"/>
+  <a:schemeClr val="accent5"/>
+  <a:schemeClr val="accent6"/>
+  <cs:variation/>
+  <cs:variation>
+    <a:lumMod val="60000"/>
+  </cs:variation>
+  <cs:variation>
+    <a:lumMod val="80000"/>
+    <a:lumOff val="20000"/>
+  </cs:variation>
+  <cs:variation>
+    <a:lumMod val="80000"/>
+  </cs:variation>
+  <cs:variation>
+    <a:lumMod val="60000"/>
+    <a:lumOff val="40000"/>
+  </cs:variation>
+  <cs:variation>
+    <a:lumMod val="50000"/>
+  </cs:variation>
+  <cs:variation>
+    <a:lumMod val="70000"/>
+    <a:lumOff val="30000"/>
+  </cs:variation>
+  <cs:variation>
+    <a:lumMod val="70000"/>
+  </cs:variation>
+  <cs:variation>
+    <a:lumMod val="50000"/>
+    <a:lumOff val="50000"/>
+  </cs:variation>
+</cs:colorStyle>
+</file>
+
+<file path=ppt/charts/style1.xml><?xml version="1.0" encoding="utf-8"?>
+<cs:chartStyle xmlns:cs="http://schemas.microsoft.com/office/drawing/2012/chartStyle" xmlns:a="http://schemas.openxmlformats.org/drawingml/2006/main" id="227">
+  <cs:axisTitle>
+    <cs:lnRef idx="0"/>
+    <cs:fillRef idx="0"/>
+    <cs:effectRef idx="0"/>
+    <cs:fontRef idx="minor">
+      <a:schemeClr val="tx1">
+        <a:lumMod val="65000"/>
+        <a:lumOff val="35000"/>
+      </a:schemeClr>
+    </cs:fontRef>
+    <cs:defRPr sz="1000" kern="1200"/>
+  </cs:axisTitle>
+  <cs:categoryAxis>
+    <cs:lnRef idx="0"/>
+    <cs:fillRef idx="0"/>
+    <cs:effectRef idx="0"/>
+    <cs:fontRef idx="minor">
+      <a:schemeClr val="tx1">
+        <a:lumMod val="65000"/>
+        <a:lumOff val="35000"/>
+      </a:schemeClr>
+    </cs:fontRef>
+    <cs:spPr>
+      <a:ln w="9525" cap="flat" cmpd="sng" algn="ctr">
+        <a:solidFill>
+          <a:schemeClr val="tx1">
+            <a:lumMod val="15000"/>
+            <a:lumOff val="85000"/>
+          </a:schemeClr>
+        </a:solidFill>
+        <a:round/>
+      </a:ln>
+    </cs:spPr>
+    <cs:defRPr sz="900" kern="1200"/>
+  </cs:categoryAxis>
+  <cs:chartArea mods="allowNoFillOverride allowNoLineOverride">
+    <cs:lnRef idx="0"/>
+    <cs:fillRef idx="0"/>
+    <cs:effectRef idx="0"/>
+    <cs:fontRef idx="minor">
+      <a:schemeClr val="tx1"/>
+    </cs:fontRef>
+    <cs:spPr>
+      <a:solidFill>
+        <a:schemeClr val="bg1"/>
+      </a:solidFill>
+      <a:ln w="9525" cap="flat" cmpd="sng" algn="ctr">
+        <a:solidFill>
+          <a:schemeClr val="tx1">
+            <a:lumMod val="15000"/>
+            <a:lumOff val="85000"/>
+          </a:schemeClr>
+        </a:solidFill>
+        <a:round/>
+      </a:ln>
+    </cs:spPr>
+    <cs:defRPr sz="1000" kern="1200"/>
+  </cs:chartArea>
+  <cs:dataLabel>
+    <cs:lnRef idx="0"/>
+    <cs:fillRef idx="0"/>
+    <cs:effectRef idx="0"/>
+    <cs:fontRef idx="minor">
+      <a:schemeClr val="tx1">
+        <a:lumMod val="75000"/>
+        <a:lumOff val="25000"/>
+      </a:schemeClr>
+    </cs:fontRef>
+    <cs:defRPr sz="900" kern="1200"/>
+  </cs:dataLabel>
+  <cs:dataLabelCallout>
+    <cs:lnRef idx="0"/>
+    <cs:fillRef idx="0"/>
+    <cs:effectRef idx="0"/>
+    <cs:fontRef idx="minor">
+      <a:schemeClr val="dk1">
+        <a:lumMod val="65000"/>
+        <a:lumOff val="35000"/>
+      </a:schemeClr>
+    </cs:fontRef>
+    <cs:spPr>
+      <a:solidFill>
+        <a:schemeClr val="lt1"/>
+      </a:solidFill>
+      <a:ln>
+        <a:solidFill>
+          <a:schemeClr val="dk1">
+            <a:lumMod val="25000"/>
+            <a:lumOff val="75000"/>
+          </a:schemeClr>
+        </a:solidFill>
+      </a:ln>
+    </cs:spPr>
+    <cs:defRPr sz="900" kern="1200"/>
+    <cs:bodyPr rot="0" spcFirstLastPara="1" vertOverflow="clip" horzOverflow="clip" vert="horz" wrap="square" lIns="36576" tIns="18288" rIns="36576" bIns="18288" anchor="ctr" anchorCtr="1">
+      <a:spAutoFit/>
+    </cs:bodyPr>
+  </cs:dataLabelCallout>
+  <cs:dataPoint>
+    <cs:lnRef idx="0"/>
+    <cs:fillRef idx="1">
+      <cs:styleClr val="auto"/>
+    </cs:fillRef>
+    <cs:effectRef idx="0"/>
+    <cs:fontRef idx="minor">
+      <a:schemeClr val="tx1"/>
+    </cs:fontRef>
+    <cs:spPr>
+      <a:solidFill>
+        <a:schemeClr val="phClr"/>
+      </a:solidFill>
+    </cs:spPr>
+  </cs:dataPoint>
+  <cs:dataPoint3D>
+    <cs:lnRef idx="0"/>
+    <cs:fillRef idx="1">
+      <cs:styleClr val="auto"/>
+    </cs:fillRef>
+    <cs:effectRef idx="0"/>
+    <cs:fontRef idx="minor">
+      <a:schemeClr val="tx1"/>
+    </cs:fontRef>
+    <cs:spPr>
+      <a:solidFill>
+        <a:schemeClr val="phClr"/>
+      </a:solidFill>
+    </cs:spPr>
+  </cs:dataPoint3D>
+  <cs:dataPointLine>
+    <cs:lnRef idx="0">
+      <cs:styleClr val="auto"/>
+    </cs:lnRef>
+    <cs:fillRef idx="1"/>
+    <cs:effectRef idx="0"/>
+    <cs:fontRef idx="minor">
+      <a:schemeClr val="tx1"/>
+    </cs:fontRef>
+    <cs:spPr>
+      <a:ln w="28575" cap="rnd">
+        <a:solidFill>
+          <a:schemeClr val="phClr"/>
+        </a:solidFill>
+        <a:round/>
+      </a:ln>
+    </cs:spPr>
+  </cs:dataPointLine>
+  <cs:dataPointMarker>
+    <cs:lnRef idx="0">
+      <cs:styleClr val="auto"/>
+    </cs:lnRef>
+    <cs:fillRef idx="1">
+      <cs:styleClr val="auto"/>
+    </cs:fillRef>
+    <cs:effectRef idx="0"/>
+    <cs:fontRef idx="minor">
+      <a:schemeClr val="tx1"/>
+    </cs:fontRef>
+    <cs:spPr>
+      <a:solidFill>
+        <a:schemeClr val="phClr"/>
+      </a:solidFill>
+      <a:ln w="9525">
+        <a:solidFill>
+          <a:schemeClr val="phClr"/>
+        </a:solidFill>
+      </a:ln>
+    </cs:spPr>
+  </cs:dataPointMarker>
+  <cs:dataPointMarkerLayout symbol="circle" size="5"/>
+  <cs:dataPointWireframe>
+    <cs:lnRef idx="0">
+      <cs:styleClr val="auto"/>
+    </cs:lnRef>
+    <cs:fillRef idx="1"/>
+    <cs:effectRef idx="0"/>
+    <cs:fontRef idx="minor">
+      <a:schemeClr val="tx1"/>
+    </cs:fontRef>
+    <cs:spPr>
+      <a:ln w="9525" cap="rnd">
+        <a:solidFill>
+          <a:schemeClr val="phClr"/>
+        </a:solidFill>
+        <a:round/>
+      </a:ln>
+    </cs:spPr>
+  </cs:dataPointWireframe>
+  <cs:dataTable>
+    <cs:lnRef idx="0"/>
+    <cs:fillRef idx="0"/>
+    <cs:effectRef idx="0"/>
+    <cs:fontRef idx="minor">
+      <a:schemeClr val="tx1">
+        <a:lumMod val="65000"/>
+        <a:lumOff val="35000"/>
+      </a:schemeClr>
+    </cs:fontRef>
+    <cs:spPr>
+      <a:noFill/>
+      <a:ln w="9525" cap="flat" cmpd="sng" algn="ctr">
+        <a:solidFill>
+          <a:schemeClr val="tx1">
+            <a:lumMod val="15000"/>
+            <a:lumOff val="85000"/>
+          </a:schemeClr>
+        </a:solidFill>
+        <a:round/>
+      </a:ln>
+    </cs:spPr>
+    <cs:defRPr sz="900" kern="1200"/>
+  </cs:dataTable>
+  <cs:downBar>
+    <cs:lnRef idx="0"/>
+    <cs:fillRef idx="0"/>
+    <cs:effectRef idx="0"/>
+    <cs:fontRef idx="minor">
+      <a:schemeClr val="dk1"/>
+    </cs:fontRef>
+    <cs:spPr>
+      <a:solidFill>
+        <a:schemeClr val="dk1">
+          <a:lumMod val="65000"/>
+          <a:lumOff val="35000"/>
+        </a:schemeClr>
+      </a:solidFill>
+      <a:ln w="9525">
+        <a:solidFill>
+          <a:schemeClr val="tx1">
+            <a:lumMod val="65000"/>
+            <a:lumOff val="35000"/>
+          </a:schemeClr>
+        </a:solidFill>
+      </a:ln>
+    </cs:spPr>
+  </cs:downBar>
+  <cs:dropLine>
+    <cs:lnRef idx="0"/>
+    <cs:fillRef idx="0"/>
+    <cs:effectRef idx="0"/>
+    <cs:fontRef idx="minor">
+      <a:schemeClr val="tx1"/>
+    </cs:fontRef>
+    <cs:spPr>
+      <a:ln w="9525" cap="flat" cmpd="sng" algn="ctr">
+        <a:solidFill>
+          <a:schemeClr val="tx1">
+            <a:lumMod val="35000"/>
+            <a:lumOff val="65000"/>
+          </a:schemeClr>
+        </a:solidFill>
+        <a:round/>
+      </a:ln>
+    </cs:spPr>
+  </cs:dropLine>
+  <cs:errorBar>
+    <cs:lnRef idx="0"/>
+    <cs:fillRef idx="0"/>
+    <cs:effectRef idx="0"/>
+    <cs:fontRef idx="minor">
+      <a:schemeClr val="tx1"/>
+    </cs:fontRef>
+    <cs:spPr>
+      <a:ln w="9525" cap="flat" cmpd="sng" algn="ctr">
+        <a:solidFill>
+          <a:schemeClr val="tx1">
+            <a:lumMod val="65000"/>
+            <a:lumOff val="35000"/>
+          </a:schemeClr>
+        </a:solidFill>
+        <a:round/>
+      </a:ln>
+    </cs:spPr>
+  </cs:errorBar>
+  <cs:floor>
+    <cs:lnRef idx="0"/>
+    <cs:fillRef idx="0"/>
+    <cs:effectRef idx="0"/>
+    <cs:fontRef idx="minor">
+      <a:schemeClr val="tx1"/>
+    </cs:fontRef>
+    <cs:spPr>
+      <a:noFill/>
+      <a:ln>
+        <a:noFill/>
+      </a:ln>
+    </cs:spPr>
+  </cs:floor>
+  <cs:gridlineMajor>
+    <cs:lnRef idx="0"/>
+    <cs:fillRef idx="0"/>
+    <cs:effectRef idx="0"/>
+    <cs:fontRef idx="minor">
+      <a:schemeClr val="tx1"/>
+    </cs:fontRef>
+    <cs:spPr>
+      <a:ln w="9525" cap="flat" cmpd="sng" algn="ctr">
+        <a:solidFill>
+          <a:schemeClr val="tx1">
+            <a:lumMod val="15000"/>
+            <a:lumOff val="85000"/>
+          </a:schemeClr>
+        </a:solidFill>
+        <a:round/>
+      </a:ln>
+    </cs:spPr>
+  </cs:gridlineMajor>
+  <cs:gridlineMinor>
+    <cs:lnRef idx="0"/>
+    <cs:fillRef idx="0"/>
+    <cs:effectRef idx="0"/>
+    <cs:fontRef idx="minor">
+      <a:schemeClr val="tx1"/>
+    </cs:fontRef>
+    <cs:spPr>
+      <a:ln w="9525" cap="flat" cmpd="sng" algn="ctr">
+        <a:solidFill>
+          <a:schemeClr val="tx1">
+            <a:lumMod val="5000"/>
+            <a:lumOff val="95000"/>
+          </a:schemeClr>
+        </a:solidFill>
+        <a:round/>
+      </a:ln>
+    </cs:spPr>
+  </cs:gridlineMinor>
+  <cs:hiLoLine>
+    <cs:lnRef idx="0"/>
+    <cs:fillRef idx="0"/>
+    <cs:effectRef idx="0"/>
+    <cs:fontRef idx="minor">
+      <a:schemeClr val="tx1"/>
+    </cs:fontRef>
+    <cs:spPr>
+      <a:ln w="9525" cap="flat" cmpd="sng" algn="ctr">
+        <a:solidFill>
+          <a:schemeClr val="tx1">
+            <a:lumMod val="75000"/>
+            <a:lumOff val="25000"/>
+          </a:schemeClr>
+        </a:solidFill>
+        <a:round/>
+      </a:ln>
+    </cs:spPr>
+  </cs:hiLoLine>
+  <cs:leaderLine>
+    <cs:lnRef idx="0"/>
+    <cs:fillRef idx="0"/>
+    <cs:effectRef idx="0"/>
+    <cs:fontRef idx="minor">
+      <a:schemeClr val="tx1"/>
+    </cs:fontRef>
+    <cs:spPr>
+      <a:ln w="9525" cap="flat" cmpd="sng" algn="ctr">
+        <a:solidFill>
+          <a:schemeClr val="tx1">
+            <a:lumMod val="35000"/>
+            <a:lumOff val="65000"/>
+          </a:schemeClr>
+        </a:solidFill>
+        <a:round/>
+      </a:ln>
+    </cs:spPr>
+  </cs:leaderLine>
+  <cs:legend>
+    <cs:lnRef idx="0"/>
+    <cs:fillRef idx="0"/>
+    <cs:effectRef idx="0"/>
+    <cs:fontRef idx="minor">
+      <a:schemeClr val="tx1">
+        <a:lumMod val="65000"/>
+        <a:lumOff val="35000"/>
+      </a:schemeClr>
+    </cs:fontRef>
+    <cs:defRPr sz="900" kern="1200"/>
+  </cs:legend>
+  <cs:plotArea mods="allowNoFillOverride allowNoLineOverride">
+    <cs:lnRef idx="0"/>
+    <cs:fillRef idx="0"/>
+    <cs:effectRef idx="0"/>
+    <cs:fontRef idx="minor">
+      <a:schemeClr val="tx1"/>
+    </cs:fontRef>
+  </cs:plotArea>
+  <cs:plotArea3D mods="allowNoFillOverride allowNoLineOverride">
+    <cs:lnRef idx="0"/>
+    <cs:fillRef idx="0"/>
+    <cs:effectRef idx="0"/>
+    <cs:fontRef idx="minor">
+      <a:schemeClr val="tx1"/>
+    </cs:fontRef>
+  </cs:plotArea3D>
+  <cs:seriesAxis>
+    <cs:lnRef idx="0"/>
+    <cs:fillRef idx="0"/>
+    <cs:effectRef idx="0"/>
+    <cs:fontRef idx="minor">
+      <a:schemeClr val="tx1">
+        <a:lumMod val="65000"/>
+        <a:lumOff val="35000"/>
+      </a:schemeClr>
+    </cs:fontRef>
+    <cs:defRPr sz="900" kern="1200"/>
+  </cs:seriesAxis>
+  <cs:seriesLine>
+    <cs:lnRef idx="0"/>
+    <cs:fillRef idx="0"/>
+    <cs:effectRef idx="0"/>
+    <cs:fontRef idx="minor">
+      <a:schemeClr val="tx1"/>
+    </cs:fontRef>
+    <cs:spPr>
+      <a:ln w="9525" cap="flat" cmpd="sng" algn="ctr">
+        <a:solidFill>
+          <a:schemeClr val="tx1">
+            <a:lumMod val="35000"/>
+            <a:lumOff val="65000"/>
+          </a:schemeClr>
+        </a:solidFill>
+        <a:round/>
+      </a:ln>
+    </cs:spPr>
+  </cs:seriesLine>
+  <cs:title>
+    <cs:lnRef idx="0"/>
+    <cs:fillRef idx="0"/>
+    <cs:effectRef idx="0"/>
+    <cs:fontRef idx="minor">
+      <a:schemeClr val="tx1">
+        <a:lumMod val="65000"/>
+        <a:lumOff val="35000"/>
+      </a:schemeClr>
+    </cs:fontRef>
+    <cs:defRPr sz="1400" b="0" kern="1200" spc="0" baseline="0"/>
+  </cs:title>
+  <cs:trendline>
+    <cs:lnRef idx="0">
+      <cs:styleClr val="auto"/>
+    </cs:lnRef>
+    <cs:fillRef idx="0"/>
+    <cs:effectRef idx="0"/>
+    <cs:fontRef idx="minor">
+      <a:schemeClr val="tx1"/>
+    </cs:fontRef>
+    <cs:spPr>
+      <a:ln w="19050" cap="rnd">
+        <a:solidFill>
+          <a:schemeClr val="phClr"/>
+        </a:solidFill>
+        <a:prstDash val="sysDot"/>
+      </a:ln>
+    </cs:spPr>
+  </cs:trendline>
+  <cs:trendlineLabel>
+    <cs:lnRef idx="0"/>
+    <cs:fillRef idx="0"/>
+    <cs:effectRef idx="0"/>
+    <cs:fontRef idx="minor">
+      <a:schemeClr val="tx1">
+        <a:lumMod val="65000"/>
+        <a:lumOff val="35000"/>
+      </a:schemeClr>
+    </cs:fontRef>
+    <cs:defRPr sz="900" kern="1200"/>
+  </cs:trendlineLabel>
+  <cs:upBar>
+    <cs:lnRef idx="0"/>
+    <cs:fillRef idx="0"/>
+    <cs:effectRef idx="0"/>
+    <cs:fontRef idx="minor">
+      <a:schemeClr val="dk1"/>
+    </cs:fontRef>
+    <cs:spPr>
+      <a:solidFill>
+        <a:schemeClr val="lt1"/>
+      </a:solidFill>
+      <a:ln w="9525">
+        <a:solidFill>
+          <a:schemeClr val="tx1">
+            <a:lumMod val="15000"/>
+            <a:lumOff val="85000"/>
+          </a:schemeClr>
+        </a:solidFill>
+      </a:ln>
+    </cs:spPr>
+  </cs:upBar>
+  <cs:valueAxis>
+    <cs:lnRef idx="0"/>
+    <cs:fillRef idx="0"/>
+    <cs:effectRef idx="0"/>
+    <cs:fontRef idx="minor">
+      <a:schemeClr val="tx1">
+        <a:lumMod val="65000"/>
+        <a:lumOff val="35000"/>
+      </a:schemeClr>
+    </cs:fontRef>
+    <cs:defRPr sz="900" kern="1200"/>
+  </cs:valueAxis>
+  <cs:wall>
+    <cs:lnRef idx="0"/>
+    <cs:fillRef idx="0"/>
+    <cs:effectRef idx="0"/>
+    <cs:fontRef idx="minor">
+      <a:schemeClr val="tx1"/>
+    </cs:fontRef>
+    <cs:spPr>
+      <a:noFill/>
+      <a:ln>
+        <a:noFill/>
+      </a:ln>
+    </cs:spPr>
+  </cs:wall>
+</cs:chartStyle>
+</file>
+
 <file path=ppt/notesMasters/notesMaster1.xml><?xml version="1.0" encoding="utf-8"?>
 <p:notesMaster xmlns:a="http://schemas.openxmlformats.org/drawingml/2006/main" xmlns:r="http://schemas.openxmlformats.org/officeDocument/2006/relationships" xmlns:p="http://schemas.openxmlformats.org/presentationml/2006/main">
   <p:cSld>
@@ -217,7 +1356,7 @@
           <a:p>
             <a:fld id="{8FD391CB-82E8-482B-9305-CB4347FBE118}" type="datetimeFigureOut">
               <a:rPr lang="en-US" smtClean="0"/>
-              <a:t>3/26/19</a:t>
+              <a:t>3/30/19</a:t>
             </a:fld>
             <a:endParaRPr lang="en-US"/>
           </a:p>
@@ -678,7 +1817,10 @@
           <a:bodyPr/>
           <a:lstStyle/>
           <a:p>
-            <a:endParaRPr lang="en-US" dirty="0"/>
+            <a:r>
+              <a:rPr lang="en-US" dirty="0"/>
+              <a:t>Map </a:t>
+            </a:r>
           </a:p>
         </p:txBody>
       </p:sp>
@@ -709,6 +1851,180 @@
     <p:extLst>
       <p:ext uri="{BB962C8B-B14F-4D97-AF65-F5344CB8AC3E}">
         <p14:creationId xmlns:p14="http://schemas.microsoft.com/office/powerpoint/2010/main" val="66092877"/>
+      </p:ext>
+    </p:extLst>
+  </p:cSld>
+  <p:clrMapOvr>
+    <a:masterClrMapping/>
+  </p:clrMapOvr>
+</p:notes>
+</file>
+
+<file path=ppt/notesSlides/notesSlide3.xml><?xml version="1.0" encoding="utf-8"?>
+<p:notes xmlns:a="http://schemas.openxmlformats.org/drawingml/2006/main" xmlns:r="http://schemas.openxmlformats.org/officeDocument/2006/relationships" xmlns:p="http://schemas.openxmlformats.org/presentationml/2006/main">
+  <p:cSld>
+    <p:spTree>
+      <p:nvGrpSpPr>
+        <p:cNvPr id="1" name=""/>
+        <p:cNvGrpSpPr/>
+        <p:nvPr/>
+      </p:nvGrpSpPr>
+      <p:grpSpPr>
+        <a:xfrm>
+          <a:off x="0" y="0"/>
+          <a:ext cx="0" cy="0"/>
+          <a:chOff x="0" y="0"/>
+          <a:chExt cx="0" cy="0"/>
+        </a:xfrm>
+      </p:grpSpPr>
+      <p:sp>
+        <p:nvSpPr>
+          <p:cNvPr id="2" name="Slide Image Placeholder 1"/>
+          <p:cNvSpPr>
+            <a:spLocks noGrp="1" noRot="1" noChangeAspect="1"/>
+          </p:cNvSpPr>
+          <p:nvPr>
+            <p:ph type="sldImg"/>
+          </p:nvPr>
+        </p:nvSpPr>
+        <p:spPr/>
+      </p:sp>
+      <p:sp>
+        <p:nvSpPr>
+          <p:cNvPr id="3" name="Notes Placeholder 2"/>
+          <p:cNvSpPr>
+            <a:spLocks noGrp="1"/>
+          </p:cNvSpPr>
+          <p:nvPr>
+            <p:ph type="body" idx="1"/>
+          </p:nvPr>
+        </p:nvSpPr>
+        <p:spPr/>
+        <p:txBody>
+          <a:bodyPr/>
+          <a:lstStyle/>
+          <a:p>
+            <a:r>
+              <a:rPr lang="en-US" dirty="0"/>
+              <a:t>Map </a:t>
+            </a:r>
+          </a:p>
+        </p:txBody>
+      </p:sp>
+      <p:sp>
+        <p:nvSpPr>
+          <p:cNvPr id="4" name="Slide Number Placeholder 3"/>
+          <p:cNvSpPr>
+            <a:spLocks noGrp="1"/>
+          </p:cNvSpPr>
+          <p:nvPr>
+            <p:ph type="sldNum" sz="quarter" idx="5"/>
+          </p:nvPr>
+        </p:nvSpPr>
+        <p:spPr/>
+        <p:txBody>
+          <a:bodyPr/>
+          <a:lstStyle/>
+          <a:p>
+            <a:fld id="{EA9C5E10-4773-4154-A2C7-389A04F1C112}" type="slidenum">
+              <a:rPr lang="en-US" smtClean="0"/>
+              <a:t>5</a:t>
+            </a:fld>
+            <a:endParaRPr lang="en-US"/>
+          </a:p>
+        </p:txBody>
+      </p:sp>
+    </p:spTree>
+    <p:extLst>
+      <p:ext uri="{BB962C8B-B14F-4D97-AF65-F5344CB8AC3E}">
+        <p14:creationId xmlns:p14="http://schemas.microsoft.com/office/powerpoint/2010/main" val="1633949433"/>
+      </p:ext>
+    </p:extLst>
+  </p:cSld>
+  <p:clrMapOvr>
+    <a:masterClrMapping/>
+  </p:clrMapOvr>
+</p:notes>
+</file>
+
+<file path=ppt/notesSlides/notesSlide4.xml><?xml version="1.0" encoding="utf-8"?>
+<p:notes xmlns:a="http://schemas.openxmlformats.org/drawingml/2006/main" xmlns:r="http://schemas.openxmlformats.org/officeDocument/2006/relationships" xmlns:p="http://schemas.openxmlformats.org/presentationml/2006/main">
+  <p:cSld>
+    <p:spTree>
+      <p:nvGrpSpPr>
+        <p:cNvPr id="1" name=""/>
+        <p:cNvGrpSpPr/>
+        <p:nvPr/>
+      </p:nvGrpSpPr>
+      <p:grpSpPr>
+        <a:xfrm>
+          <a:off x="0" y="0"/>
+          <a:ext cx="0" cy="0"/>
+          <a:chOff x="0" y="0"/>
+          <a:chExt cx="0" cy="0"/>
+        </a:xfrm>
+      </p:grpSpPr>
+      <p:sp>
+        <p:nvSpPr>
+          <p:cNvPr id="2" name="Slide Image Placeholder 1"/>
+          <p:cNvSpPr>
+            <a:spLocks noGrp="1" noRot="1" noChangeAspect="1"/>
+          </p:cNvSpPr>
+          <p:nvPr>
+            <p:ph type="sldImg"/>
+          </p:nvPr>
+        </p:nvSpPr>
+        <p:spPr/>
+      </p:sp>
+      <p:sp>
+        <p:nvSpPr>
+          <p:cNvPr id="3" name="Notes Placeholder 2"/>
+          <p:cNvSpPr>
+            <a:spLocks noGrp="1"/>
+          </p:cNvSpPr>
+          <p:nvPr>
+            <p:ph type="body" idx="1"/>
+          </p:nvPr>
+        </p:nvSpPr>
+        <p:spPr/>
+        <p:txBody>
+          <a:bodyPr/>
+          <a:lstStyle/>
+          <a:p>
+            <a:r>
+              <a:rPr lang="en-US" dirty="0"/>
+              <a:t>Map </a:t>
+            </a:r>
+          </a:p>
+        </p:txBody>
+      </p:sp>
+      <p:sp>
+        <p:nvSpPr>
+          <p:cNvPr id="4" name="Slide Number Placeholder 3"/>
+          <p:cNvSpPr>
+            <a:spLocks noGrp="1"/>
+          </p:cNvSpPr>
+          <p:nvPr>
+            <p:ph type="sldNum" sz="quarter" idx="5"/>
+          </p:nvPr>
+        </p:nvSpPr>
+        <p:spPr/>
+        <p:txBody>
+          <a:bodyPr/>
+          <a:lstStyle/>
+          <a:p>
+            <a:fld id="{EA9C5E10-4773-4154-A2C7-389A04F1C112}" type="slidenum">
+              <a:rPr lang="en-US" smtClean="0"/>
+              <a:t>6</a:t>
+            </a:fld>
+            <a:endParaRPr lang="en-US"/>
+          </a:p>
+        </p:txBody>
+      </p:sp>
+    </p:spTree>
+    <p:extLst>
+      <p:ext uri="{BB962C8B-B14F-4D97-AF65-F5344CB8AC3E}">
+        <p14:creationId xmlns:p14="http://schemas.microsoft.com/office/powerpoint/2010/main" val="1628776077"/>
       </p:ext>
     </p:extLst>
   </p:cSld>
@@ -8278,6 +9594,632 @@
 </p:sld>
 </file>
 
+<file path=ppt/slides/slide10.xml><?xml version="1.0" encoding="utf-8"?>
+<p:sld xmlns:a="http://schemas.openxmlformats.org/drawingml/2006/main" xmlns:r="http://schemas.openxmlformats.org/officeDocument/2006/relationships" xmlns:p="http://schemas.openxmlformats.org/presentationml/2006/main">
+  <p:cSld>
+    <p:spTree>
+      <p:nvGrpSpPr>
+        <p:cNvPr id="1" name=""/>
+        <p:cNvGrpSpPr/>
+        <p:nvPr/>
+      </p:nvGrpSpPr>
+      <p:grpSpPr>
+        <a:xfrm>
+          <a:off x="0" y="0"/>
+          <a:ext cx="0" cy="0"/>
+          <a:chOff x="0" y="0"/>
+          <a:chExt cx="0" cy="0"/>
+        </a:xfrm>
+      </p:grpSpPr>
+      <p:sp>
+        <p:nvSpPr>
+          <p:cNvPr id="2" name="Title 1"/>
+          <p:cNvSpPr>
+            <a:spLocks noGrp="1"/>
+          </p:cNvSpPr>
+          <p:nvPr>
+            <p:ph type="title"/>
+          </p:nvPr>
+        </p:nvSpPr>
+        <p:spPr/>
+        <p:txBody>
+          <a:bodyPr/>
+          <a:lstStyle/>
+          <a:p>
+            <a:endParaRPr lang="en-US" sz="3600" dirty="0"/>
+          </a:p>
+        </p:txBody>
+      </p:sp>
+      <p:pic>
+        <p:nvPicPr>
+          <p:cNvPr id="7" name="Content Placeholder 6" descr="A close up of a logo&#10;&#10;Description automatically generated">
+            <a:extLst>
+              <a:ext uri="{FF2B5EF4-FFF2-40B4-BE49-F238E27FC236}">
+                <a16:creationId xmlns:a16="http://schemas.microsoft.com/office/drawing/2014/main" id="{E0846866-26FB-F84E-9342-B3DA11EE2535}"/>
+              </a:ext>
+            </a:extLst>
+          </p:cNvPr>
+          <p:cNvPicPr>
+            <a:picLocks noGrp="1" noChangeAspect="1"/>
+          </p:cNvPicPr>
+          <p:nvPr>
+            <p:ph idx="1"/>
+          </p:nvPr>
+        </p:nvPicPr>
+        <p:blipFill>
+          <a:blip r:embed="rId2">
+            <a:extLst>
+              <a:ext uri="{28A0092B-C50C-407E-A947-70E740481C1C}">
+                <a14:useLocalDpi xmlns:a14="http://schemas.microsoft.com/office/drawing/2010/main" val="0"/>
+              </a:ext>
+            </a:extLst>
+          </a:blip>
+          <a:stretch>
+            <a:fillRect/>
+          </a:stretch>
+        </p:blipFill>
+        <p:spPr>
+          <a:xfrm>
+            <a:off x="838200" y="640080"/>
+            <a:ext cx="10515600" cy="5270389"/>
+          </a:xfrm>
+        </p:spPr>
+      </p:pic>
+    </p:spTree>
+    <p:extLst>
+      <p:ext uri="{BB962C8B-B14F-4D97-AF65-F5344CB8AC3E}">
+        <p14:creationId xmlns:p14="http://schemas.microsoft.com/office/powerpoint/2010/main" val="133348775"/>
+      </p:ext>
+    </p:extLst>
+  </p:cSld>
+  <p:clrMapOvr>
+    <a:masterClrMapping/>
+  </p:clrMapOvr>
+</p:sld>
+</file>
+
+<file path=ppt/slides/slide11.xml><?xml version="1.0" encoding="utf-8"?>
+<p:sld xmlns:a="http://schemas.openxmlformats.org/drawingml/2006/main" xmlns:r="http://schemas.openxmlformats.org/officeDocument/2006/relationships" xmlns:p="http://schemas.openxmlformats.org/presentationml/2006/main">
+  <p:cSld>
+    <p:spTree>
+      <p:nvGrpSpPr>
+        <p:cNvPr id="1" name=""/>
+        <p:cNvGrpSpPr/>
+        <p:nvPr/>
+      </p:nvGrpSpPr>
+      <p:grpSpPr>
+        <a:xfrm>
+          <a:off x="0" y="0"/>
+          <a:ext cx="0" cy="0"/>
+          <a:chOff x="0" y="0"/>
+          <a:chExt cx="0" cy="0"/>
+        </a:xfrm>
+      </p:grpSpPr>
+      <p:sp>
+        <p:nvSpPr>
+          <p:cNvPr id="3" name="Content Placeholder 2">
+            <a:extLst>
+              <a:ext uri="{FF2B5EF4-FFF2-40B4-BE49-F238E27FC236}">
+                <a16:creationId xmlns:a16="http://schemas.microsoft.com/office/drawing/2014/main" id="{6CF408CB-54E2-C14D-98EC-E6D5AE1684C5}"/>
+              </a:ext>
+            </a:extLst>
+          </p:cNvPr>
+          <p:cNvSpPr>
+            <a:spLocks noGrp="1"/>
+          </p:cNvSpPr>
+          <p:nvPr>
+            <p:ph idx="1"/>
+          </p:nvPr>
+        </p:nvSpPr>
+        <p:spPr/>
+        <p:txBody>
+          <a:bodyPr/>
+          <a:lstStyle/>
+          <a:p>
+            <a:r>
+              <a:rPr lang="en-US" dirty="0"/>
+              <a:t>Pros</a:t>
+            </a:r>
+          </a:p>
+          <a:p>
+            <a:pPr lvl="1"/>
+            <a:r>
+              <a:rPr lang="en-US" dirty="0"/>
+              <a:t>Pie Chart can let audience easily see large disparities when presenting in data.</a:t>
+            </a:r>
+          </a:p>
+          <a:p>
+            <a:pPr lvl="1"/>
+            <a:r>
+              <a:rPr lang="en-US" dirty="0"/>
+              <a:t>Pie chart can emphasize data when there are only few units, especially when the number is less than 3.</a:t>
+            </a:r>
+          </a:p>
+          <a:p>
+            <a:pPr marL="457200" lvl="1" indent="0">
+              <a:buNone/>
+            </a:pPr>
+            <a:endParaRPr lang="en-US" dirty="0"/>
+          </a:p>
+          <a:p>
+            <a:pPr lvl="1"/>
+            <a:endParaRPr lang="en-US" dirty="0"/>
+          </a:p>
+        </p:txBody>
+      </p:sp>
+      <p:sp>
+        <p:nvSpPr>
+          <p:cNvPr id="6" name="Title 5">
+            <a:extLst>
+              <a:ext uri="{FF2B5EF4-FFF2-40B4-BE49-F238E27FC236}">
+                <a16:creationId xmlns:a16="http://schemas.microsoft.com/office/drawing/2014/main" id="{27E8A2D3-8986-0F45-90E0-CB0C85259C7D}"/>
+              </a:ext>
+            </a:extLst>
+          </p:cNvPr>
+          <p:cNvSpPr>
+            <a:spLocks noGrp="1"/>
+          </p:cNvSpPr>
+          <p:nvPr>
+            <p:ph type="title"/>
+          </p:nvPr>
+        </p:nvSpPr>
+        <p:spPr>
+          <a:xfrm>
+            <a:off x="838200" y="640080"/>
+            <a:ext cx="10515600" cy="727075"/>
+          </a:xfrm>
+        </p:spPr>
+        <p:txBody>
+          <a:bodyPr/>
+          <a:lstStyle/>
+          <a:p>
+            <a:r>
+              <a:rPr lang="en-US" dirty="0"/>
+              <a:t>Pie Chart Pros &amp; Cons</a:t>
+            </a:r>
+          </a:p>
+        </p:txBody>
+      </p:sp>
+    </p:spTree>
+    <p:extLst>
+      <p:ext uri="{BB962C8B-B14F-4D97-AF65-F5344CB8AC3E}">
+        <p14:creationId xmlns:p14="http://schemas.microsoft.com/office/powerpoint/2010/main" val="547837732"/>
+      </p:ext>
+    </p:extLst>
+  </p:cSld>
+  <p:clrMapOvr>
+    <a:masterClrMapping/>
+  </p:clrMapOvr>
+</p:sld>
+</file>
+
+<file path=ppt/slides/slide12.xml><?xml version="1.0" encoding="utf-8"?>
+<p:sld xmlns:a="http://schemas.openxmlformats.org/drawingml/2006/main" xmlns:r="http://schemas.openxmlformats.org/officeDocument/2006/relationships" xmlns:p="http://schemas.openxmlformats.org/presentationml/2006/main">
+  <p:cSld>
+    <p:spTree>
+      <p:nvGrpSpPr>
+        <p:cNvPr id="1" name=""/>
+        <p:cNvGrpSpPr/>
+        <p:nvPr/>
+      </p:nvGrpSpPr>
+      <p:grpSpPr>
+        <a:xfrm>
+          <a:off x="0" y="0"/>
+          <a:ext cx="0" cy="0"/>
+          <a:chOff x="0" y="0"/>
+          <a:chExt cx="0" cy="0"/>
+        </a:xfrm>
+      </p:grpSpPr>
+      <p:sp>
+        <p:nvSpPr>
+          <p:cNvPr id="3" name="Content Placeholder 2">
+            <a:extLst>
+              <a:ext uri="{FF2B5EF4-FFF2-40B4-BE49-F238E27FC236}">
+                <a16:creationId xmlns:a16="http://schemas.microsoft.com/office/drawing/2014/main" id="{6CF408CB-54E2-C14D-98EC-E6D5AE1684C5}"/>
+              </a:ext>
+            </a:extLst>
+          </p:cNvPr>
+          <p:cNvSpPr>
+            <a:spLocks noGrp="1"/>
+          </p:cNvSpPr>
+          <p:nvPr>
+            <p:ph idx="1"/>
+          </p:nvPr>
+        </p:nvSpPr>
+        <p:spPr/>
+        <p:txBody>
+          <a:bodyPr/>
+          <a:lstStyle/>
+          <a:p>
+            <a:r>
+              <a:rPr lang="en-US" dirty="0"/>
+              <a:t>Pros</a:t>
+            </a:r>
+          </a:p>
+          <a:p>
+            <a:pPr lvl="1"/>
+            <a:r>
+              <a:rPr lang="en-US" dirty="0"/>
+              <a:t>Pie chart are not good option for comparing more than 5 pieces of data. It’s extremely hard for audience to distinguished among different unit.</a:t>
+            </a:r>
+          </a:p>
+          <a:p>
+            <a:pPr lvl="1"/>
+            <a:r>
+              <a:rPr lang="en-US" dirty="0"/>
+              <a:t>Pie chart won’t give audience on the ranking of the data. If the ranking is important, Bar chart is a better option.</a:t>
+            </a:r>
+          </a:p>
+          <a:p>
+            <a:pPr lvl="1"/>
+            <a:r>
+              <a:rPr lang="en-US" dirty="0"/>
+              <a:t>If involve with second factor, pie chart is not a good option, in that case, line chart or scatter-plot are better choice.</a:t>
+            </a:r>
+          </a:p>
+          <a:p>
+            <a:pPr lvl="1"/>
+            <a:endParaRPr lang="en-US" dirty="0"/>
+          </a:p>
+        </p:txBody>
+      </p:sp>
+      <p:sp>
+        <p:nvSpPr>
+          <p:cNvPr id="6" name="Title 5">
+            <a:extLst>
+              <a:ext uri="{FF2B5EF4-FFF2-40B4-BE49-F238E27FC236}">
+                <a16:creationId xmlns:a16="http://schemas.microsoft.com/office/drawing/2014/main" id="{27E8A2D3-8986-0F45-90E0-CB0C85259C7D}"/>
+              </a:ext>
+            </a:extLst>
+          </p:cNvPr>
+          <p:cNvSpPr>
+            <a:spLocks noGrp="1"/>
+          </p:cNvSpPr>
+          <p:nvPr>
+            <p:ph type="title"/>
+          </p:nvPr>
+        </p:nvSpPr>
+        <p:spPr>
+          <a:xfrm>
+            <a:off x="838200" y="640080"/>
+            <a:ext cx="10515600" cy="727075"/>
+          </a:xfrm>
+        </p:spPr>
+        <p:txBody>
+          <a:bodyPr/>
+          <a:lstStyle/>
+          <a:p>
+            <a:r>
+              <a:rPr lang="en-US" dirty="0"/>
+              <a:t>Bar Chart Pros &amp; Cons</a:t>
+            </a:r>
+          </a:p>
+        </p:txBody>
+      </p:sp>
+    </p:spTree>
+    <p:extLst>
+      <p:ext uri="{BB962C8B-B14F-4D97-AF65-F5344CB8AC3E}">
+        <p14:creationId xmlns:p14="http://schemas.microsoft.com/office/powerpoint/2010/main" val="1835686222"/>
+      </p:ext>
+    </p:extLst>
+  </p:cSld>
+  <p:clrMapOvr>
+    <a:masterClrMapping/>
+  </p:clrMapOvr>
+</p:sld>
+</file>
+
+<file path=ppt/slides/slide13.xml><?xml version="1.0" encoding="utf-8"?>
+<p:sld xmlns:a="http://schemas.openxmlformats.org/drawingml/2006/main" xmlns:r="http://schemas.openxmlformats.org/officeDocument/2006/relationships" xmlns:p="http://schemas.openxmlformats.org/presentationml/2006/main">
+  <p:cSld>
+    <p:spTree>
+      <p:nvGrpSpPr>
+        <p:cNvPr id="1" name=""/>
+        <p:cNvGrpSpPr/>
+        <p:nvPr/>
+      </p:nvGrpSpPr>
+      <p:grpSpPr>
+        <a:xfrm>
+          <a:off x="0" y="0"/>
+          <a:ext cx="0" cy="0"/>
+          <a:chOff x="0" y="0"/>
+          <a:chExt cx="0" cy="0"/>
+        </a:xfrm>
+      </p:grpSpPr>
+      <p:sp>
+        <p:nvSpPr>
+          <p:cNvPr id="2" name="Title 1"/>
+          <p:cNvSpPr>
+            <a:spLocks noGrp="1"/>
+          </p:cNvSpPr>
+          <p:nvPr>
+            <p:ph type="title"/>
+          </p:nvPr>
+        </p:nvSpPr>
+        <p:spPr/>
+        <p:txBody>
+          <a:bodyPr/>
+          <a:lstStyle/>
+          <a:p>
+            <a:endParaRPr lang="en-US" sz="3600" dirty="0"/>
+          </a:p>
+        </p:txBody>
+      </p:sp>
+      <p:graphicFrame>
+        <p:nvGraphicFramePr>
+          <p:cNvPr id="7" name="Content Placeholder 6">
+            <a:extLst>
+              <a:ext uri="{FF2B5EF4-FFF2-40B4-BE49-F238E27FC236}">
+                <a16:creationId xmlns:a16="http://schemas.microsoft.com/office/drawing/2014/main" id="{73416506-0081-7649-8671-D5FA4AB894F0}"/>
+              </a:ext>
+            </a:extLst>
+          </p:cNvPr>
+          <p:cNvGraphicFramePr>
+            <a:graphicFrameLocks noGrp="1"/>
+          </p:cNvGraphicFramePr>
+          <p:nvPr>
+            <p:ph idx="1"/>
+            <p:extLst>
+              <p:ext uri="{D42A27DB-BD31-4B8C-83A1-F6EECF244321}">
+                <p14:modId xmlns:p14="http://schemas.microsoft.com/office/powerpoint/2010/main" val="2144464389"/>
+              </p:ext>
+            </p:extLst>
+          </p:nvPr>
+        </p:nvGraphicFramePr>
+        <p:xfrm>
+          <a:off x="838200" y="1463674"/>
+          <a:ext cx="10863470" cy="4632325"/>
+        </p:xfrm>
+        <a:graphic>
+          <a:graphicData uri="http://schemas.openxmlformats.org/drawingml/2006/chart">
+            <c:chart xmlns:c="http://schemas.openxmlformats.org/drawingml/2006/chart" xmlns:r="http://schemas.openxmlformats.org/officeDocument/2006/relationships" r:id="rId2"/>
+          </a:graphicData>
+        </a:graphic>
+      </p:graphicFrame>
+    </p:spTree>
+    <p:extLst>
+      <p:ext uri="{BB962C8B-B14F-4D97-AF65-F5344CB8AC3E}">
+        <p14:creationId xmlns:p14="http://schemas.microsoft.com/office/powerpoint/2010/main" val="1969301694"/>
+      </p:ext>
+    </p:extLst>
+  </p:cSld>
+  <p:clrMapOvr>
+    <a:masterClrMapping/>
+  </p:clrMapOvr>
+</p:sld>
+</file>
+
+<file path=ppt/slides/slide14.xml><?xml version="1.0" encoding="utf-8"?>
+<p:sld xmlns:a="http://schemas.openxmlformats.org/drawingml/2006/main" xmlns:r="http://schemas.openxmlformats.org/officeDocument/2006/relationships" xmlns:p="http://schemas.openxmlformats.org/presentationml/2006/main">
+  <p:cSld>
+    <p:spTree>
+      <p:nvGrpSpPr>
+        <p:cNvPr id="1" name=""/>
+        <p:cNvGrpSpPr/>
+        <p:nvPr/>
+      </p:nvGrpSpPr>
+      <p:grpSpPr>
+        <a:xfrm>
+          <a:off x="0" y="0"/>
+          <a:ext cx="0" cy="0"/>
+          <a:chOff x="0" y="0"/>
+          <a:chExt cx="0" cy="0"/>
+        </a:xfrm>
+      </p:grpSpPr>
+      <p:sp>
+        <p:nvSpPr>
+          <p:cNvPr id="3" name="Content Placeholder 2">
+            <a:extLst>
+              <a:ext uri="{FF2B5EF4-FFF2-40B4-BE49-F238E27FC236}">
+                <a16:creationId xmlns:a16="http://schemas.microsoft.com/office/drawing/2014/main" id="{6CF408CB-54E2-C14D-98EC-E6D5AE1684C5}"/>
+              </a:ext>
+            </a:extLst>
+          </p:cNvPr>
+          <p:cNvSpPr>
+            <a:spLocks noGrp="1"/>
+          </p:cNvSpPr>
+          <p:nvPr>
+            <p:ph idx="1"/>
+          </p:nvPr>
+        </p:nvSpPr>
+        <p:spPr/>
+        <p:txBody>
+          <a:bodyPr/>
+          <a:lstStyle/>
+          <a:p>
+            <a:r>
+              <a:rPr lang="en-US" dirty="0"/>
+              <a:t>Pros</a:t>
+            </a:r>
+          </a:p>
+          <a:p>
+            <a:pPr lvl="1"/>
+            <a:r>
+              <a:rPr lang="en-US" dirty="0"/>
+              <a:t>Line chart is good for trend over time.</a:t>
+            </a:r>
+          </a:p>
+          <a:p>
+            <a:pPr lvl="1"/>
+            <a:r>
+              <a:rPr lang="en-US" dirty="0"/>
+              <a:t>Line chart shows relationship with a continuous periodical data.</a:t>
+            </a:r>
+          </a:p>
+          <a:p>
+            <a:pPr lvl="1"/>
+            <a:r>
+              <a:rPr lang="en-US" dirty="0"/>
+              <a:t>Line chart reflects the change over the time</a:t>
+            </a:r>
+          </a:p>
+          <a:p>
+            <a:pPr marL="457200" lvl="1" indent="0">
+              <a:buNone/>
+            </a:pPr>
+            <a:endParaRPr lang="en-US" dirty="0"/>
+          </a:p>
+          <a:p>
+            <a:pPr lvl="1"/>
+            <a:endParaRPr lang="en-US" dirty="0"/>
+          </a:p>
+        </p:txBody>
+      </p:sp>
+      <p:sp>
+        <p:nvSpPr>
+          <p:cNvPr id="6" name="Title 5">
+            <a:extLst>
+              <a:ext uri="{FF2B5EF4-FFF2-40B4-BE49-F238E27FC236}">
+                <a16:creationId xmlns:a16="http://schemas.microsoft.com/office/drawing/2014/main" id="{27E8A2D3-8986-0F45-90E0-CB0C85259C7D}"/>
+              </a:ext>
+            </a:extLst>
+          </p:cNvPr>
+          <p:cNvSpPr>
+            <a:spLocks noGrp="1"/>
+          </p:cNvSpPr>
+          <p:nvPr>
+            <p:ph type="title"/>
+          </p:nvPr>
+        </p:nvSpPr>
+        <p:spPr>
+          <a:xfrm>
+            <a:off x="838200" y="640080"/>
+            <a:ext cx="10515600" cy="727075"/>
+          </a:xfrm>
+        </p:spPr>
+        <p:txBody>
+          <a:bodyPr/>
+          <a:lstStyle/>
+          <a:p>
+            <a:r>
+              <a:rPr lang="en-US" dirty="0"/>
+              <a:t>Line Chart Pros &amp; Cons</a:t>
+            </a:r>
+          </a:p>
+        </p:txBody>
+      </p:sp>
+    </p:spTree>
+    <p:extLst>
+      <p:ext uri="{BB962C8B-B14F-4D97-AF65-F5344CB8AC3E}">
+        <p14:creationId xmlns:p14="http://schemas.microsoft.com/office/powerpoint/2010/main" val="2358015186"/>
+      </p:ext>
+    </p:extLst>
+  </p:cSld>
+  <p:clrMapOvr>
+    <a:masterClrMapping/>
+  </p:clrMapOvr>
+</p:sld>
+</file>
+
+<file path=ppt/slides/slide15.xml><?xml version="1.0" encoding="utf-8"?>
+<p:sld xmlns:a="http://schemas.openxmlformats.org/drawingml/2006/main" xmlns:r="http://schemas.openxmlformats.org/officeDocument/2006/relationships" xmlns:p="http://schemas.openxmlformats.org/presentationml/2006/main">
+  <p:cSld>
+    <p:spTree>
+      <p:nvGrpSpPr>
+        <p:cNvPr id="1" name=""/>
+        <p:cNvGrpSpPr/>
+        <p:nvPr/>
+      </p:nvGrpSpPr>
+      <p:grpSpPr>
+        <a:xfrm>
+          <a:off x="0" y="0"/>
+          <a:ext cx="0" cy="0"/>
+          <a:chOff x="0" y="0"/>
+          <a:chExt cx="0" cy="0"/>
+        </a:xfrm>
+      </p:grpSpPr>
+      <p:sp>
+        <p:nvSpPr>
+          <p:cNvPr id="3" name="Content Placeholder 2">
+            <a:extLst>
+              <a:ext uri="{FF2B5EF4-FFF2-40B4-BE49-F238E27FC236}">
+                <a16:creationId xmlns:a16="http://schemas.microsoft.com/office/drawing/2014/main" id="{6CF408CB-54E2-C14D-98EC-E6D5AE1684C5}"/>
+              </a:ext>
+            </a:extLst>
+          </p:cNvPr>
+          <p:cNvSpPr>
+            <a:spLocks noGrp="1"/>
+          </p:cNvSpPr>
+          <p:nvPr>
+            <p:ph idx="1"/>
+          </p:nvPr>
+        </p:nvSpPr>
+        <p:spPr/>
+        <p:txBody>
+          <a:bodyPr/>
+          <a:lstStyle/>
+          <a:p>
+            <a:r>
+              <a:rPr lang="en-US" dirty="0"/>
+              <a:t>Pros</a:t>
+            </a:r>
+          </a:p>
+          <a:p>
+            <a:pPr lvl="1"/>
+            <a:r>
+              <a:rPr lang="en-US" dirty="0"/>
+              <a:t>Line only works periodical data</a:t>
+            </a:r>
+          </a:p>
+          <a:p>
+            <a:pPr lvl="1"/>
+            <a:r>
+              <a:rPr lang="en-US" dirty="0"/>
+              <a:t>When there are many categories especially more than seven, line chart doesn’t show the real ranking in that case, side by side bar chart may be better.</a:t>
+            </a:r>
+          </a:p>
+          <a:p>
+            <a:pPr lvl="1"/>
+            <a:endParaRPr lang="en-US" dirty="0"/>
+          </a:p>
+        </p:txBody>
+      </p:sp>
+      <p:sp>
+        <p:nvSpPr>
+          <p:cNvPr id="6" name="Title 5">
+            <a:extLst>
+              <a:ext uri="{FF2B5EF4-FFF2-40B4-BE49-F238E27FC236}">
+                <a16:creationId xmlns:a16="http://schemas.microsoft.com/office/drawing/2014/main" id="{27E8A2D3-8986-0F45-90E0-CB0C85259C7D}"/>
+              </a:ext>
+            </a:extLst>
+          </p:cNvPr>
+          <p:cNvSpPr>
+            <a:spLocks noGrp="1"/>
+          </p:cNvSpPr>
+          <p:nvPr>
+            <p:ph type="title"/>
+          </p:nvPr>
+        </p:nvSpPr>
+        <p:spPr>
+          <a:xfrm>
+            <a:off x="838200" y="640080"/>
+            <a:ext cx="10515600" cy="727075"/>
+          </a:xfrm>
+        </p:spPr>
+        <p:txBody>
+          <a:bodyPr/>
+          <a:lstStyle/>
+          <a:p>
+            <a:r>
+              <a:rPr lang="en-US" dirty="0"/>
+              <a:t>Bar Chart Pros &amp; Cons</a:t>
+            </a:r>
+          </a:p>
+        </p:txBody>
+      </p:sp>
+    </p:spTree>
+    <p:extLst>
+      <p:ext uri="{BB962C8B-B14F-4D97-AF65-F5344CB8AC3E}">
+        <p14:creationId xmlns:p14="http://schemas.microsoft.com/office/powerpoint/2010/main" val="3162720667"/>
+      </p:ext>
+    </p:extLst>
+  </p:cSld>
+  <p:clrMapOvr>
+    <a:masterClrMapping/>
+  </p:clrMapOvr>
+</p:sld>
+</file>
+
 <file path=ppt/slides/slide2.xml><?xml version="1.0" encoding="utf-8"?>
 <p:sld xmlns:a="http://schemas.openxmlformats.org/drawingml/2006/main" xmlns:r="http://schemas.openxmlformats.org/officeDocument/2006/relationships" xmlns:p="http://schemas.openxmlformats.org/presentationml/2006/main">
   <p:cSld>
@@ -8934,7 +10876,7 @@
                   <a:schemeClr val="bg1"/>
                 </a:solidFill>
               </a:rPr>
-              <a:t>How many answers have up votes and down votes</a:t>
+              <a:t>Open source contribution</a:t>
             </a:r>
           </a:p>
           <a:p>
@@ -8944,7 +10886,7 @@
                   <a:schemeClr val="bg1"/>
                 </a:solidFill>
               </a:rPr>
-              <a:t>Top 20 users' ranking by yearly growth</a:t>
+              <a:t>Years coding distributions</a:t>
             </a:r>
           </a:p>
           <a:p>
@@ -9379,45 +11321,96 @@
           <a:chExt cx="0" cy="0"/>
         </a:xfrm>
       </p:grpSpPr>
-      <p:pic>
-        <p:nvPicPr>
-          <p:cNvPr id="5" name="Content Placeholder 4" descr="A screenshot of a cell phone&#10;&#10;Description automatically generated">
+      <p:sp>
+        <p:nvSpPr>
+          <p:cNvPr id="4" name="Content Placeholder 3">
             <a:extLst>
               <a:ext uri="{FF2B5EF4-FFF2-40B4-BE49-F238E27FC236}">
-                <a16:creationId xmlns:a16="http://schemas.microsoft.com/office/drawing/2014/main" id="{D3FAC722-4875-D442-8B73-FD5693DE20AA}"/>
+                <a16:creationId xmlns:a16="http://schemas.microsoft.com/office/drawing/2014/main" id="{C150F208-A0C5-F54A-8837-81A8CD32FFC7}"/>
               </a:ext>
             </a:extLst>
           </p:cNvPr>
-          <p:cNvPicPr>
-            <a:picLocks noGrp="1" noChangeAspect="1"/>
-          </p:cNvPicPr>
+          <p:cNvSpPr>
+            <a:spLocks noGrp="1"/>
+          </p:cNvSpPr>
           <p:nvPr>
             <p:ph idx="1"/>
           </p:nvPr>
-        </p:nvPicPr>
-        <p:blipFill>
-          <a:blip r:embed="rId2">
+        </p:nvSpPr>
+        <p:spPr>
+          <a:xfrm>
+            <a:off x="838200" y="1463040"/>
+            <a:ext cx="10515600" cy="4458258"/>
+          </a:xfrm>
+        </p:spPr>
+        <p:txBody>
+          <a:bodyPr/>
+          <a:lstStyle/>
+          <a:p>
+            <a:r>
+              <a:rPr lang="en-US" dirty="0"/>
+              <a:t>Pros</a:t>
+            </a:r>
+          </a:p>
+          <a:p>
+            <a:pPr lvl="1"/>
+            <a:r>
+              <a:rPr lang="en-US" dirty="0"/>
+              <a:t>It giving a geometry view that different country’s data</a:t>
+            </a:r>
+          </a:p>
+          <a:p>
+            <a:pPr lvl="1"/>
+            <a:r>
+              <a:rPr lang="en-US" dirty="0"/>
+              <a:t>It gave the context we are using, like by country or state.</a:t>
+            </a:r>
+          </a:p>
+          <a:p>
+            <a:pPr lvl="1"/>
+            <a:r>
+              <a:rPr lang="en-US" dirty="0"/>
+              <a:t>If the focus for data not total country based. But only story-teller only focus top 3 geometries, it can give the audience very straight-forward view.</a:t>
+            </a:r>
+          </a:p>
+          <a:p>
+            <a:pPr lvl="1"/>
+            <a:endParaRPr lang="en-US" dirty="0"/>
+          </a:p>
+        </p:txBody>
+      </p:sp>
+      <p:sp>
+        <p:nvSpPr>
+          <p:cNvPr id="6" name="Title 5">
             <a:extLst>
-              <a:ext uri="{28A0092B-C50C-407E-A947-70E740481C1C}">
-                <a14:useLocalDpi xmlns:a14="http://schemas.microsoft.com/office/drawing/2010/main" val="0"/>
+              <a:ext uri="{FF2B5EF4-FFF2-40B4-BE49-F238E27FC236}">
+                <a16:creationId xmlns:a16="http://schemas.microsoft.com/office/drawing/2014/main" id="{5ACF44B1-05E4-B943-B722-59D6E51657E4}"/>
               </a:ext>
             </a:extLst>
-          </a:blip>
-          <a:stretch>
-            <a:fillRect/>
-          </a:stretch>
-        </p:blipFill>
-        <p:spPr>
-          <a:xfrm>
-            <a:off x="838201" y="1232452"/>
-            <a:ext cx="5112025" cy="4679342"/>
-          </a:xfrm>
-        </p:spPr>
-      </p:pic>
+          </p:cNvPr>
+          <p:cNvSpPr>
+            <a:spLocks noGrp="1"/>
+          </p:cNvSpPr>
+          <p:nvPr>
+            <p:ph type="title"/>
+          </p:nvPr>
+        </p:nvSpPr>
+        <p:spPr/>
+        <p:txBody>
+          <a:bodyPr/>
+          <a:lstStyle/>
+          <a:p>
+            <a:r>
+              <a:rPr lang="en-US" dirty="0"/>
+              <a:t>Map Chart Pros &amp; Cons</a:t>
+            </a:r>
+          </a:p>
+        </p:txBody>
+      </p:sp>
     </p:spTree>
     <p:extLst>
       <p:ext uri="{BB962C8B-B14F-4D97-AF65-F5344CB8AC3E}">
-        <p14:creationId xmlns:p14="http://schemas.microsoft.com/office/powerpoint/2010/main" val="972843775"/>
+        <p14:creationId xmlns:p14="http://schemas.microsoft.com/office/powerpoint/2010/main" val="1221478417"/>
       </p:ext>
     </p:extLst>
   </p:cSld>
@@ -9446,62 +11439,113 @@
       </p:grpSpPr>
       <p:sp>
         <p:nvSpPr>
-          <p:cNvPr id="2" name="Title 1"/>
-          <p:cNvSpPr>
-            <a:spLocks noGrp="1"/>
-          </p:cNvSpPr>
-          <p:nvPr>
-            <p:ph type="title"/>
-          </p:nvPr>
-        </p:nvSpPr>
-        <p:spPr/>
-        <p:txBody>
-          <a:bodyPr/>
-          <a:lstStyle/>
-          <a:p>
-            <a:endParaRPr lang="en-US" sz="3600" dirty="0"/>
-          </a:p>
-        </p:txBody>
-      </p:sp>
-      <p:pic>
-        <p:nvPicPr>
-          <p:cNvPr id="7" name="Content Placeholder 6" descr="A close up of a logo&#10;&#10;Description automatically generated">
+          <p:cNvPr id="4" name="Content Placeholder 3">
             <a:extLst>
               <a:ext uri="{FF2B5EF4-FFF2-40B4-BE49-F238E27FC236}">
-                <a16:creationId xmlns:a16="http://schemas.microsoft.com/office/drawing/2014/main" id="{E0846866-26FB-F84E-9342-B3DA11EE2535}"/>
+                <a16:creationId xmlns:a16="http://schemas.microsoft.com/office/drawing/2014/main" id="{C150F208-A0C5-F54A-8837-81A8CD32FFC7}"/>
               </a:ext>
             </a:extLst>
           </p:cNvPr>
-          <p:cNvPicPr>
-            <a:picLocks noGrp="1" noChangeAspect="1"/>
-          </p:cNvPicPr>
+          <p:cNvSpPr>
+            <a:spLocks noGrp="1"/>
+          </p:cNvSpPr>
           <p:nvPr>
             <p:ph idx="1"/>
           </p:nvPr>
-        </p:nvPicPr>
-        <p:blipFill>
-          <a:blip r:embed="rId2">
+        </p:nvSpPr>
+        <p:spPr>
+          <a:xfrm>
+            <a:off x="838200" y="1463040"/>
+            <a:ext cx="10515600" cy="4458258"/>
+          </a:xfrm>
+        </p:spPr>
+        <p:txBody>
+          <a:bodyPr/>
+          <a:lstStyle/>
+          <a:p>
+            <a:r>
+              <a:rPr lang="en-US" dirty="0"/>
+              <a:t>Cons</a:t>
+            </a:r>
+          </a:p>
+          <a:p>
+            <a:pPr lvl="1"/>
+            <a:r>
+              <a:rPr lang="en-US" dirty="0"/>
+              <a:t>It doesn’t give audience the details like the value or ranking</a:t>
+            </a:r>
+          </a:p>
+          <a:p>
+            <a:pPr lvl="1"/>
+            <a:r>
+              <a:rPr lang="en-US" dirty="0"/>
+              <a:t>If story-teller wants to give further analysis, like above/beyond average, P90, map chart is not going to help.</a:t>
+            </a:r>
+          </a:p>
+          <a:p>
+            <a:pPr lvl="1"/>
+            <a:r>
+              <a:rPr lang="en-US" dirty="0"/>
+              <a:t>Sometimes map is actually misleading and causes to draw the wrong conclusions about data(</a:t>
+            </a:r>
+            <a:r>
+              <a:rPr lang="en-US" dirty="0" err="1"/>
+              <a:t>Eg</a:t>
+            </a:r>
+            <a:r>
+              <a:rPr lang="en-US" dirty="0"/>
+              <a:t> look at India here you might not know why India has second participants in the world, may be by populations or their IT industry is good)</a:t>
+            </a:r>
+          </a:p>
+          <a:p>
+            <a:pPr lvl="1"/>
+            <a:r>
+              <a:rPr lang="en-US" dirty="0"/>
+              <a:t>If story-teller want to focus on data and details, bar chart should be used</a:t>
+            </a:r>
+          </a:p>
+          <a:p>
+            <a:pPr lvl="1"/>
+            <a:endParaRPr lang="en-US" dirty="0"/>
+          </a:p>
+          <a:p>
+            <a:pPr lvl="1"/>
+            <a:endParaRPr lang="en-US" dirty="0"/>
+          </a:p>
+        </p:txBody>
+      </p:sp>
+      <p:sp>
+        <p:nvSpPr>
+          <p:cNvPr id="6" name="Title 5">
             <a:extLst>
-              <a:ext uri="{28A0092B-C50C-407E-A947-70E740481C1C}">
-                <a14:useLocalDpi xmlns:a14="http://schemas.microsoft.com/office/drawing/2010/main" val="0"/>
+              <a:ext uri="{FF2B5EF4-FFF2-40B4-BE49-F238E27FC236}">
+                <a16:creationId xmlns:a16="http://schemas.microsoft.com/office/drawing/2014/main" id="{5ACF44B1-05E4-B943-B722-59D6E51657E4}"/>
               </a:ext>
             </a:extLst>
-          </a:blip>
-          <a:stretch>
-            <a:fillRect/>
-          </a:stretch>
-        </p:blipFill>
-        <p:spPr>
-          <a:xfrm>
-            <a:off x="838200" y="640080"/>
-            <a:ext cx="10515600" cy="5270389"/>
-          </a:xfrm>
-        </p:spPr>
-      </p:pic>
+          </p:cNvPr>
+          <p:cNvSpPr>
+            <a:spLocks noGrp="1"/>
+          </p:cNvSpPr>
+          <p:nvPr>
+            <p:ph type="title"/>
+          </p:nvPr>
+        </p:nvSpPr>
+        <p:spPr/>
+        <p:txBody>
+          <a:bodyPr/>
+          <a:lstStyle/>
+          <a:p>
+            <a:r>
+              <a:rPr lang="en-US" dirty="0"/>
+              <a:t>Map Chart Pros &amp; Cons</a:t>
+            </a:r>
+          </a:p>
+        </p:txBody>
+      </p:sp>
     </p:spTree>
     <p:extLst>
       <p:ext uri="{BB962C8B-B14F-4D97-AF65-F5344CB8AC3E}">
-        <p14:creationId xmlns:p14="http://schemas.microsoft.com/office/powerpoint/2010/main" val="133348775"/>
+        <p14:creationId xmlns:p14="http://schemas.microsoft.com/office/powerpoint/2010/main" val="2476517804"/>
       </p:ext>
     </p:extLst>
   </p:cSld>
@@ -9528,31 +11572,12 @@
           <a:chExt cx="0" cy="0"/>
         </a:xfrm>
       </p:grpSpPr>
-      <p:sp>
-        <p:nvSpPr>
-          <p:cNvPr id="2" name="Title 1"/>
-          <p:cNvSpPr>
-            <a:spLocks noGrp="1"/>
-          </p:cNvSpPr>
-          <p:nvPr>
-            <p:ph type="title"/>
-          </p:nvPr>
-        </p:nvSpPr>
-        <p:spPr/>
-        <p:txBody>
-          <a:bodyPr/>
-          <a:lstStyle/>
-          <a:p>
-            <a:endParaRPr lang="en-US" sz="3600" dirty="0"/>
-          </a:p>
-        </p:txBody>
-      </p:sp>
       <p:pic>
         <p:nvPicPr>
-          <p:cNvPr id="6" name="Content Placeholder 5" descr="A picture containing screenshot&#10;&#10;Description automatically generated">
+          <p:cNvPr id="5" name="Content Placeholder 4" descr="A screenshot of a cell phone&#10;&#10;Description automatically generated">
             <a:extLst>
               <a:ext uri="{FF2B5EF4-FFF2-40B4-BE49-F238E27FC236}">
-                <a16:creationId xmlns:a16="http://schemas.microsoft.com/office/drawing/2014/main" id="{2132CCD6-05AB-1746-A037-F6553E97E51C}"/>
+                <a16:creationId xmlns:a16="http://schemas.microsoft.com/office/drawing/2014/main" id="{D3FAC722-4875-D442-8B73-FD5693DE20AA}"/>
               </a:ext>
             </a:extLst>
           </p:cNvPr>
@@ -9577,15 +11602,258 @@
         </p:blipFill>
         <p:spPr>
           <a:xfrm>
-            <a:off x="838201" y="640080"/>
-            <a:ext cx="8835886" cy="5449895"/>
+            <a:off x="838201" y="1232452"/>
+            <a:ext cx="5112025" cy="4679342"/>
           </a:xfrm>
         </p:spPr>
       </p:pic>
     </p:spTree>
     <p:extLst>
       <p:ext uri="{BB962C8B-B14F-4D97-AF65-F5344CB8AC3E}">
-        <p14:creationId xmlns:p14="http://schemas.microsoft.com/office/powerpoint/2010/main" val="1969301694"/>
+        <p14:creationId xmlns:p14="http://schemas.microsoft.com/office/powerpoint/2010/main" val="972843775"/>
+      </p:ext>
+    </p:extLst>
+  </p:cSld>
+  <p:clrMapOvr>
+    <a:masterClrMapping/>
+  </p:clrMapOvr>
+</p:sld>
+</file>
+
+<file path=ppt/slides/slide8.xml><?xml version="1.0" encoding="utf-8"?>
+<p:sld xmlns:a="http://schemas.openxmlformats.org/drawingml/2006/main" xmlns:r="http://schemas.openxmlformats.org/officeDocument/2006/relationships" xmlns:p="http://schemas.openxmlformats.org/presentationml/2006/main">
+  <p:cSld>
+    <p:spTree>
+      <p:nvGrpSpPr>
+        <p:cNvPr id="1" name=""/>
+        <p:cNvGrpSpPr/>
+        <p:nvPr/>
+      </p:nvGrpSpPr>
+      <p:grpSpPr>
+        <a:xfrm>
+          <a:off x="0" y="0"/>
+          <a:ext cx="0" cy="0"/>
+          <a:chOff x="0" y="0"/>
+          <a:chExt cx="0" cy="0"/>
+        </a:xfrm>
+      </p:grpSpPr>
+      <p:sp>
+        <p:nvSpPr>
+          <p:cNvPr id="3" name="Content Placeholder 2">
+            <a:extLst>
+              <a:ext uri="{FF2B5EF4-FFF2-40B4-BE49-F238E27FC236}">
+                <a16:creationId xmlns:a16="http://schemas.microsoft.com/office/drawing/2014/main" id="{6CF408CB-54E2-C14D-98EC-E6D5AE1684C5}"/>
+              </a:ext>
+            </a:extLst>
+          </p:cNvPr>
+          <p:cNvSpPr>
+            <a:spLocks noGrp="1"/>
+          </p:cNvSpPr>
+          <p:nvPr>
+            <p:ph idx="1"/>
+          </p:nvPr>
+        </p:nvSpPr>
+        <p:spPr/>
+        <p:txBody>
+          <a:bodyPr/>
+          <a:lstStyle/>
+          <a:p>
+            <a:r>
+              <a:rPr lang="en-US" dirty="0"/>
+              <a:t>Pros</a:t>
+            </a:r>
+          </a:p>
+          <a:p>
+            <a:pPr lvl="1"/>
+            <a:r>
+              <a:rPr lang="en-US" dirty="0"/>
+              <a:t>Bar chart is good for categories type’s distribution, it gives intuitive relative relation between the categories for the audience</a:t>
+            </a:r>
+          </a:p>
+          <a:p>
+            <a:pPr lvl="1"/>
+            <a:r>
+              <a:rPr lang="en-US" dirty="0"/>
+              <a:t>Bar chart summarizes a large data set by a simplified visual form.</a:t>
+            </a:r>
+          </a:p>
+          <a:p>
+            <a:pPr lvl="1"/>
+            <a:r>
+              <a:rPr lang="en-US" dirty="0"/>
+              <a:t>Bar chart can be easily understood.</a:t>
+            </a:r>
+          </a:p>
+          <a:p>
+            <a:pPr lvl="1"/>
+            <a:r>
+              <a:rPr lang="en-US" dirty="0"/>
+              <a:t>With using title and axis’s help, bar chart can deliver the central idea of the story.</a:t>
+            </a:r>
+          </a:p>
+          <a:p>
+            <a:pPr lvl="1"/>
+            <a:endParaRPr lang="en-US" dirty="0"/>
+          </a:p>
+        </p:txBody>
+      </p:sp>
+      <p:sp>
+        <p:nvSpPr>
+          <p:cNvPr id="6" name="Title 5">
+            <a:extLst>
+              <a:ext uri="{FF2B5EF4-FFF2-40B4-BE49-F238E27FC236}">
+                <a16:creationId xmlns:a16="http://schemas.microsoft.com/office/drawing/2014/main" id="{27E8A2D3-8986-0F45-90E0-CB0C85259C7D}"/>
+              </a:ext>
+            </a:extLst>
+          </p:cNvPr>
+          <p:cNvSpPr>
+            <a:spLocks noGrp="1"/>
+          </p:cNvSpPr>
+          <p:nvPr>
+            <p:ph type="title"/>
+          </p:nvPr>
+        </p:nvSpPr>
+        <p:spPr>
+          <a:xfrm>
+            <a:off x="838200" y="640080"/>
+            <a:ext cx="10515600" cy="727075"/>
+          </a:xfrm>
+        </p:spPr>
+        <p:txBody>
+          <a:bodyPr/>
+          <a:lstStyle/>
+          <a:p>
+            <a:r>
+              <a:rPr lang="en-US" dirty="0"/>
+              <a:t>Bar Chart Pros &amp; Cons</a:t>
+            </a:r>
+          </a:p>
+        </p:txBody>
+      </p:sp>
+    </p:spTree>
+    <p:extLst>
+      <p:ext uri="{BB962C8B-B14F-4D97-AF65-F5344CB8AC3E}">
+        <p14:creationId xmlns:p14="http://schemas.microsoft.com/office/powerpoint/2010/main" val="1380640371"/>
+      </p:ext>
+    </p:extLst>
+  </p:cSld>
+  <p:clrMapOvr>
+    <a:masterClrMapping/>
+  </p:clrMapOvr>
+</p:sld>
+</file>
+
+<file path=ppt/slides/slide9.xml><?xml version="1.0" encoding="utf-8"?>
+<p:sld xmlns:a="http://schemas.openxmlformats.org/drawingml/2006/main" xmlns:r="http://schemas.openxmlformats.org/officeDocument/2006/relationships" xmlns:p="http://schemas.openxmlformats.org/presentationml/2006/main">
+  <p:cSld>
+    <p:spTree>
+      <p:nvGrpSpPr>
+        <p:cNvPr id="1" name=""/>
+        <p:cNvGrpSpPr/>
+        <p:nvPr/>
+      </p:nvGrpSpPr>
+      <p:grpSpPr>
+        <a:xfrm>
+          <a:off x="0" y="0"/>
+          <a:ext cx="0" cy="0"/>
+          <a:chOff x="0" y="0"/>
+          <a:chExt cx="0" cy="0"/>
+        </a:xfrm>
+      </p:grpSpPr>
+      <p:sp>
+        <p:nvSpPr>
+          <p:cNvPr id="3" name="Content Placeholder 2">
+            <a:extLst>
+              <a:ext uri="{FF2B5EF4-FFF2-40B4-BE49-F238E27FC236}">
+                <a16:creationId xmlns:a16="http://schemas.microsoft.com/office/drawing/2014/main" id="{6CF408CB-54E2-C14D-98EC-E6D5AE1684C5}"/>
+              </a:ext>
+            </a:extLst>
+          </p:cNvPr>
+          <p:cNvSpPr>
+            <a:spLocks noGrp="1"/>
+          </p:cNvSpPr>
+          <p:nvPr>
+            <p:ph idx="1"/>
+          </p:nvPr>
+        </p:nvSpPr>
+        <p:spPr/>
+        <p:txBody>
+          <a:bodyPr/>
+          <a:lstStyle/>
+          <a:p>
+            <a:r>
+              <a:rPr lang="en-US" dirty="0"/>
+              <a:t>Cons</a:t>
+            </a:r>
+          </a:p>
+          <a:p>
+            <a:pPr lvl="1"/>
+            <a:r>
+              <a:rPr lang="en-US" dirty="0"/>
+              <a:t>Bar chart doesn’t give the inside relationship between the category.</a:t>
+            </a:r>
+          </a:p>
+          <a:p>
+            <a:pPr lvl="1"/>
+            <a:r>
+              <a:rPr lang="en-US" dirty="0"/>
+              <a:t>Since it’s simplicity, sometimes bar char need more explanation.</a:t>
+            </a:r>
+          </a:p>
+          <a:p>
+            <a:pPr lvl="1"/>
+            <a:r>
+              <a:rPr lang="en-US" dirty="0"/>
+              <a:t>Different order of bar chart can express different key point of story, sometimes this could be misleading.</a:t>
+            </a:r>
+          </a:p>
+          <a:p>
+            <a:pPr lvl="1"/>
+            <a:endParaRPr lang="en-US" dirty="0"/>
+          </a:p>
+          <a:p>
+            <a:pPr lvl="1"/>
+            <a:endParaRPr lang="en-US" dirty="0"/>
+          </a:p>
+        </p:txBody>
+      </p:sp>
+      <p:sp>
+        <p:nvSpPr>
+          <p:cNvPr id="6" name="Title 5">
+            <a:extLst>
+              <a:ext uri="{FF2B5EF4-FFF2-40B4-BE49-F238E27FC236}">
+                <a16:creationId xmlns:a16="http://schemas.microsoft.com/office/drawing/2014/main" id="{27E8A2D3-8986-0F45-90E0-CB0C85259C7D}"/>
+              </a:ext>
+            </a:extLst>
+          </p:cNvPr>
+          <p:cNvSpPr>
+            <a:spLocks noGrp="1"/>
+          </p:cNvSpPr>
+          <p:nvPr>
+            <p:ph type="title"/>
+          </p:nvPr>
+        </p:nvSpPr>
+        <p:spPr>
+          <a:xfrm>
+            <a:off x="838200" y="640080"/>
+            <a:ext cx="10515600" cy="727075"/>
+          </a:xfrm>
+        </p:spPr>
+        <p:txBody>
+          <a:bodyPr/>
+          <a:lstStyle/>
+          <a:p>
+            <a:r>
+              <a:rPr lang="en-US" dirty="0"/>
+              <a:t>Bar Chart Pros &amp; Cons</a:t>
+            </a:r>
+          </a:p>
+        </p:txBody>
+      </p:sp>
+    </p:spTree>
+    <p:extLst>
+      <p:ext uri="{BB962C8B-B14F-4D97-AF65-F5344CB8AC3E}">
+        <p14:creationId xmlns:p14="http://schemas.microsoft.com/office/powerpoint/2010/main" val="776358163"/>
       </p:ext>
     </p:extLst>
   </p:cSld>

</xml_diff>